<commit_message>
add code for 01
</commit_message>
<xml_diff>
--- a/.slides/01-introduction-to-gtest.pptx
+++ b/.slides/01-introduction-to-gtest.pptx
@@ -299,7 +299,7 @@
               <a:pPr>
                 <a:defRPr/>
               </a:pPr>
-              <a:t>3/29/15</a:t>
+              <a:t>3/30/2015</a:t>
             </a:fld>
             <a:endParaRPr lang="en-US"/>
           </a:p>
@@ -650,7 +650,7 @@
           </a:ln>
           <a:extLst>
             <a:ext uri="{909E8E84-426E-40dd-AFC4-6F175D3DCCD1}">
-              <a14:hiddenFill xmlns:a14="http://schemas.microsoft.com/office/drawing/2010/main" xmlns="">
+              <a14:hiddenFill xmlns="" xmlns:a14="http://schemas.microsoft.com/office/drawing/2010/main">
                 <a:noFill/>
               </a14:hiddenFill>
             </a:ext>
@@ -694,7 +694,7 @@
           </a:ln>
           <a:extLst>
             <a:ext uri="{909E8E84-426E-40dd-AFC4-6F175D3DCCD1}">
-              <a14:hiddenFill xmlns:a14="http://schemas.microsoft.com/office/drawing/2010/main" xmlns="">
+              <a14:hiddenFill xmlns="" xmlns:a14="http://schemas.microsoft.com/office/drawing/2010/main">
                 <a:noFill/>
               </a14:hiddenFill>
             </a:ext>
@@ -743,14 +743,14 @@
           </a:ln>
           <a:extLst>
             <a:ext uri="{909E8E84-426E-40dd-AFC4-6F175D3DCCD1}">
-              <a14:hiddenFill xmlns:a14="http://schemas.microsoft.com/office/drawing/2010/main" xmlns="">
+              <a14:hiddenFill xmlns="" xmlns:a14="http://schemas.microsoft.com/office/drawing/2010/main">
                 <a:solidFill>
                   <a:srgbClr val="FFFFFF"/>
                 </a:solidFill>
               </a14:hiddenFill>
             </a:ext>
             <a:ext uri="{91240B29-F687-4f45-9708-019B960494DF}">
-              <a14:hiddenLine xmlns:a14="http://schemas.microsoft.com/office/drawing/2010/main" xmlns="" w="9525">
+              <a14:hiddenLine xmlns="" xmlns:a14="http://schemas.microsoft.com/office/drawing/2010/main" w="9525">
                 <a:solidFill>
                   <a:srgbClr val="000000"/>
                 </a:solidFill>
@@ -789,7 +789,7 @@
           </a:lstStyle>
           <a:p>
             <a:r>
-              <a:rPr lang="zh-CHS" altLang="en-US" smtClean="0"/>
+              <a:rPr lang="zh-Hans" altLang="en-US" smtClean="0"/>
               <a:t>单击此处编辑母版标题样式</a:t>
             </a:r>
             <a:endParaRPr lang="en-US" dirty="0"/>
@@ -849,35 +849,35 @@
           <a:p>
             <a:pPr lvl="0"/>
             <a:r>
-              <a:rPr lang="zh-CHS" altLang="en-US" smtClean="0"/>
+              <a:rPr lang="zh-Hans" altLang="en-US" smtClean="0"/>
               <a:t>单击此处编辑母版文本样式</a:t>
             </a:r>
           </a:p>
           <a:p>
             <a:pPr lvl="1"/>
             <a:r>
-              <a:rPr lang="zh-CHS" altLang="en-US" smtClean="0"/>
+              <a:rPr lang="zh-Hans" altLang="en-US" smtClean="0"/>
               <a:t>第二级</a:t>
             </a:r>
           </a:p>
           <a:p>
             <a:pPr lvl="2"/>
             <a:r>
-              <a:rPr lang="zh-CHS" altLang="en-US" smtClean="0"/>
+              <a:rPr lang="zh-Hans" altLang="en-US" smtClean="0"/>
               <a:t>第三级</a:t>
             </a:r>
           </a:p>
           <a:p>
             <a:pPr lvl="3"/>
             <a:r>
-              <a:rPr lang="zh-CHS" altLang="en-US" smtClean="0"/>
+              <a:rPr lang="zh-Hans" altLang="en-US" smtClean="0"/>
               <a:t>第四级</a:t>
             </a:r>
           </a:p>
           <a:p>
             <a:pPr lvl="4"/>
             <a:r>
-              <a:rPr lang="zh-CHS" altLang="en-US" smtClean="0"/>
+              <a:rPr lang="zh-Hans" altLang="en-US" smtClean="0"/>
               <a:t>第五级</a:t>
             </a:r>
             <a:endParaRPr lang="en-US" dirty="0"/>
@@ -960,7 +960,7 @@
           <a:p>
             <a:pPr lvl="0"/>
             <a:r>
-              <a:rPr lang="zh-CHS" altLang="en-US" smtClean="0"/>
+              <a:rPr lang="zh-Hans" altLang="en-US" smtClean="0"/>
               <a:t>单击此处编辑母版文本样式</a:t>
             </a:r>
           </a:p>
@@ -1095,7 +1095,7 @@
           </a:ln>
           <a:extLst>
             <a:ext uri="{909E8E84-426E-40dd-AFC4-6F175D3DCCD1}">
-              <a14:hiddenFill xmlns:a14="http://schemas.microsoft.com/office/drawing/2010/main" xmlns="">
+              <a14:hiddenFill xmlns="" xmlns:a14="http://schemas.microsoft.com/office/drawing/2010/main">
                 <a:noFill/>
               </a14:hiddenFill>
             </a:ext>
@@ -1144,14 +1144,14 @@
           </a:ln>
           <a:extLst>
             <a:ext uri="{909E8E84-426E-40dd-AFC4-6F175D3DCCD1}">
-              <a14:hiddenFill xmlns:a14="http://schemas.microsoft.com/office/drawing/2010/main" xmlns="">
+              <a14:hiddenFill xmlns="" xmlns:a14="http://schemas.microsoft.com/office/drawing/2010/main">
                 <a:solidFill>
                   <a:srgbClr val="FFFFFF"/>
                 </a:solidFill>
               </a14:hiddenFill>
             </a:ext>
             <a:ext uri="{91240B29-F687-4f45-9708-019B960494DF}">
-              <a14:hiddenLine xmlns:a14="http://schemas.microsoft.com/office/drawing/2010/main" xmlns="" w="9525">
+              <a14:hiddenLine xmlns="" xmlns:a14="http://schemas.microsoft.com/office/drawing/2010/main" w="9525">
                 <a:solidFill>
                   <a:srgbClr val="000000"/>
                 </a:solidFill>
@@ -1190,7 +1190,7 @@
           </a:lstStyle>
           <a:p>
             <a:r>
-              <a:rPr lang="zh-CHS" altLang="en-US" smtClean="0"/>
+              <a:rPr lang="zh-Hans" altLang="en-US" smtClean="0"/>
               <a:t>单击此处编辑母版标题样式</a:t>
             </a:r>
             <a:endParaRPr lang="en-US" dirty="0"/>
@@ -1285,35 +1285,35 @@
           <a:p>
             <a:pPr lvl="0"/>
             <a:r>
-              <a:rPr lang="zh-CHS" altLang="en-US" smtClean="0"/>
+              <a:rPr lang="zh-Hans" altLang="en-US" smtClean="0"/>
               <a:t>单击此处编辑母版文本样式</a:t>
             </a:r>
           </a:p>
           <a:p>
             <a:pPr lvl="1"/>
             <a:r>
-              <a:rPr lang="zh-CHS" altLang="en-US" smtClean="0"/>
+              <a:rPr lang="zh-Hans" altLang="en-US" smtClean="0"/>
               <a:t>第二级</a:t>
             </a:r>
           </a:p>
           <a:p>
             <a:pPr lvl="2"/>
             <a:r>
-              <a:rPr lang="zh-CHS" altLang="en-US" smtClean="0"/>
+              <a:rPr lang="zh-Hans" altLang="en-US" smtClean="0"/>
               <a:t>第三级</a:t>
             </a:r>
           </a:p>
           <a:p>
             <a:pPr lvl="3"/>
             <a:r>
-              <a:rPr lang="zh-CHS" altLang="en-US" smtClean="0"/>
+              <a:rPr lang="zh-Hans" altLang="en-US" smtClean="0"/>
               <a:t>第四级</a:t>
             </a:r>
           </a:p>
           <a:p>
             <a:pPr lvl="4"/>
             <a:r>
-              <a:rPr lang="zh-CHS" altLang="en-US" smtClean="0"/>
+              <a:rPr lang="zh-Hans" altLang="en-US" smtClean="0"/>
               <a:t>第五级</a:t>
             </a:r>
             <a:endParaRPr lang="en-US" dirty="0"/>
@@ -1378,7 +1378,7 @@
           </a:ln>
           <a:extLst>
             <a:ext uri="{909E8E84-426E-40dd-AFC4-6F175D3DCCD1}">
-              <a14:hiddenFill xmlns:a14="http://schemas.microsoft.com/office/drawing/2010/main" xmlns="">
+              <a14:hiddenFill xmlns="" xmlns:a14="http://schemas.microsoft.com/office/drawing/2010/main">
                 <a:noFill/>
               </a14:hiddenFill>
             </a:ext>
@@ -1422,7 +1422,7 @@
           </a:ln>
           <a:extLst>
             <a:ext uri="{909E8E84-426E-40dd-AFC4-6F175D3DCCD1}">
-              <a14:hiddenFill xmlns:a14="http://schemas.microsoft.com/office/drawing/2010/main" xmlns="">
+              <a14:hiddenFill xmlns="" xmlns:a14="http://schemas.microsoft.com/office/drawing/2010/main">
                 <a:noFill/>
               </a14:hiddenFill>
             </a:ext>
@@ -1471,14 +1471,14 @@
           </a:ln>
           <a:extLst>
             <a:ext uri="{909E8E84-426E-40dd-AFC4-6F175D3DCCD1}">
-              <a14:hiddenFill xmlns:a14="http://schemas.microsoft.com/office/drawing/2010/main" xmlns="">
+              <a14:hiddenFill xmlns="" xmlns:a14="http://schemas.microsoft.com/office/drawing/2010/main">
                 <a:solidFill>
                   <a:srgbClr val="FFFFFF"/>
                 </a:solidFill>
               </a14:hiddenFill>
             </a:ext>
             <a:ext uri="{91240B29-F687-4f45-9708-019B960494DF}">
-              <a14:hiddenLine xmlns:a14="http://schemas.microsoft.com/office/drawing/2010/main" xmlns="" w="9525">
+              <a14:hiddenLine xmlns="" xmlns:a14="http://schemas.microsoft.com/office/drawing/2010/main" w="9525">
                 <a:solidFill>
                   <a:srgbClr val="000000"/>
                 </a:solidFill>
@@ -1752,7 +1752,7 @@
           </a:ln>
           <a:extLst>
             <a:ext uri="{909E8E84-426E-40dd-AFC4-6F175D3DCCD1}">
-              <a14:hiddenFill xmlns:a14="http://schemas.microsoft.com/office/drawing/2010/main" xmlns="">
+              <a14:hiddenFill xmlns="" xmlns:a14="http://schemas.microsoft.com/office/drawing/2010/main">
                 <a:noFill/>
               </a14:hiddenFill>
             </a:ext>
@@ -1957,7 +1957,7 @@
           </a:ln>
           <a:extLst>
             <a:ext uri="{909E8E84-426E-40dd-AFC4-6F175D3DCCD1}">
-              <a14:hiddenFill xmlns:a14="http://schemas.microsoft.com/office/drawing/2010/main" xmlns="">
+              <a14:hiddenFill xmlns="" xmlns:a14="http://schemas.microsoft.com/office/drawing/2010/main">
                 <a:noFill/>
               </a14:hiddenFill>
             </a:ext>
@@ -2167,7 +2167,7 @@
           </a:ln>
           <a:extLst>
             <a:ext uri="{909E8E84-426E-40dd-AFC4-6F175D3DCCD1}">
-              <a14:hiddenFill xmlns:a14="http://schemas.microsoft.com/office/drawing/2010/main" xmlns="">
+              <a14:hiddenFill xmlns="" xmlns:a14="http://schemas.microsoft.com/office/drawing/2010/main">
                 <a:noFill/>
               </a14:hiddenFill>
             </a:ext>
@@ -2418,7 +2418,7 @@
           </a:ln>
           <a:extLst>
             <a:ext uri="{909E8E84-426E-40dd-AFC4-6F175D3DCCD1}">
-              <a14:hiddenFill xmlns:a14="http://schemas.microsoft.com/office/drawing/2010/main" xmlns="">
+              <a14:hiddenFill xmlns="" xmlns:a14="http://schemas.microsoft.com/office/drawing/2010/main">
                 <a:noFill/>
               </a14:hiddenFill>
             </a:ext>
@@ -2467,14 +2467,14 @@
           </a:ln>
           <a:extLst>
             <a:ext uri="{909E8E84-426E-40dd-AFC4-6F175D3DCCD1}">
-              <a14:hiddenFill xmlns:a14="http://schemas.microsoft.com/office/drawing/2010/main" xmlns="">
+              <a14:hiddenFill xmlns="" xmlns:a14="http://schemas.microsoft.com/office/drawing/2010/main">
                 <a:solidFill>
                   <a:srgbClr val="FFFFFF"/>
                 </a:solidFill>
               </a14:hiddenFill>
             </a:ext>
             <a:ext uri="{91240B29-F687-4f45-9708-019B960494DF}">
-              <a14:hiddenLine xmlns:a14="http://schemas.microsoft.com/office/drawing/2010/main" xmlns="" w="9525">
+              <a14:hiddenLine xmlns="" xmlns:a14="http://schemas.microsoft.com/office/drawing/2010/main" w="9525">
                 <a:solidFill>
                   <a:srgbClr val="000000"/>
                 </a:solidFill>
@@ -2736,7 +2736,7 @@
           </a:ln>
           <a:extLst>
             <a:ext uri="{909E8E84-426E-40dd-AFC4-6F175D3DCCD1}">
-              <a14:hiddenFill xmlns:a14="http://schemas.microsoft.com/office/drawing/2010/main" xmlns="">
+              <a14:hiddenFill xmlns="" xmlns:a14="http://schemas.microsoft.com/office/drawing/2010/main">
                 <a:noFill/>
               </a14:hiddenFill>
             </a:ext>
@@ -2785,14 +2785,14 @@
           </a:ln>
           <a:extLst>
             <a:ext uri="{909E8E84-426E-40dd-AFC4-6F175D3DCCD1}">
-              <a14:hiddenFill xmlns:a14="http://schemas.microsoft.com/office/drawing/2010/main" xmlns="">
+              <a14:hiddenFill xmlns="" xmlns:a14="http://schemas.microsoft.com/office/drawing/2010/main">
                 <a:solidFill>
                   <a:srgbClr val="FFFFFF"/>
                 </a:solidFill>
               </a14:hiddenFill>
             </a:ext>
             <a:ext uri="{91240B29-F687-4f45-9708-019B960494DF}">
-              <a14:hiddenLine xmlns:a14="http://schemas.microsoft.com/office/drawing/2010/main" xmlns="" w="9525">
+              <a14:hiddenLine xmlns="" xmlns:a14="http://schemas.microsoft.com/office/drawing/2010/main" w="9525">
                 <a:solidFill>
                   <a:srgbClr val="000000"/>
                 </a:solidFill>
@@ -3437,7 +3437,7 @@
           </a:ln>
           <a:extLst>
             <a:ext uri="{909E8E84-426E-40dd-AFC4-6F175D3DCCD1}">
-              <a14:hiddenFill xmlns:a14="http://schemas.microsoft.com/office/drawing/2010/main" xmlns="">
+              <a14:hiddenFill xmlns="" xmlns:a14="http://schemas.microsoft.com/office/drawing/2010/main">
                 <a:noFill/>
               </a14:hiddenFill>
             </a:ext>
@@ -3467,7 +3467,7 @@
           <a:lstStyle/>
           <a:p>
             <a:r>
-              <a:rPr lang="zh-CHS" altLang="en-US" smtClean="0"/>
+              <a:rPr lang="zh-Hans" altLang="en-US" smtClean="0"/>
               <a:t>单击此处编辑母版标题样式</a:t>
             </a:r>
             <a:endParaRPr lang="en-US"/>
@@ -3504,35 +3504,35 @@
           <a:p>
             <a:pPr lvl="0"/>
             <a:r>
-              <a:rPr lang="zh-CHS" altLang="en-US" smtClean="0"/>
+              <a:rPr lang="zh-Hans" altLang="en-US" smtClean="0"/>
               <a:t>单击此处编辑母版文本样式</a:t>
             </a:r>
           </a:p>
           <a:p>
             <a:pPr lvl="1"/>
             <a:r>
-              <a:rPr lang="zh-CHS" altLang="en-US" smtClean="0"/>
+              <a:rPr lang="zh-Hans" altLang="en-US" smtClean="0"/>
               <a:t>第二级</a:t>
             </a:r>
           </a:p>
           <a:p>
             <a:pPr lvl="2"/>
             <a:r>
-              <a:rPr lang="zh-CHS" altLang="en-US" smtClean="0"/>
+              <a:rPr lang="zh-Hans" altLang="en-US" smtClean="0"/>
               <a:t>第三级</a:t>
             </a:r>
           </a:p>
           <a:p>
             <a:pPr lvl="3"/>
             <a:r>
-              <a:rPr lang="zh-CHS" altLang="en-US" smtClean="0"/>
+              <a:rPr lang="zh-Hans" altLang="en-US" smtClean="0"/>
               <a:t>第四级</a:t>
             </a:r>
           </a:p>
           <a:p>
             <a:pPr lvl="4"/>
             <a:r>
-              <a:rPr lang="zh-CHS" altLang="en-US" smtClean="0"/>
+              <a:rPr lang="zh-Hans" altLang="en-US" smtClean="0"/>
               <a:t>第五级</a:t>
             </a:r>
             <a:endParaRPr lang="en-US" dirty="0"/>
@@ -3630,7 +3630,7 @@
           </a:ln>
           <a:extLst>
             <a:ext uri="{909E8E84-426E-40dd-AFC4-6F175D3DCCD1}">
-              <a14:hiddenFill xmlns:a14="http://schemas.microsoft.com/office/drawing/2010/main" xmlns="">
+              <a14:hiddenFill xmlns="" xmlns:a14="http://schemas.microsoft.com/office/drawing/2010/main">
                 <a:noFill/>
               </a14:hiddenFill>
             </a:ext>
@@ -3671,7 +3671,7 @@
           </a:ln>
           <a:extLst>
             <a:ext uri="{909E8E84-426E-40dd-AFC4-6F175D3DCCD1}">
-              <a14:hiddenFill xmlns:a14="http://schemas.microsoft.com/office/drawing/2010/main" xmlns="">
+              <a14:hiddenFill xmlns="" xmlns:a14="http://schemas.microsoft.com/office/drawing/2010/main">
                 <a:noFill/>
               </a14:hiddenFill>
             </a:ext>
@@ -3882,7 +3882,7 @@
           </a:ln>
           <a:extLst>
             <a:ext uri="{909E8E84-426E-40dd-AFC4-6F175D3DCCD1}">
-              <a14:hiddenFill xmlns:a14="http://schemas.microsoft.com/office/drawing/2010/main" xmlns="">
+              <a14:hiddenFill xmlns="" xmlns:a14="http://schemas.microsoft.com/office/drawing/2010/main">
                 <a:noFill/>
               </a14:hiddenFill>
             </a:ext>
@@ -3931,14 +3931,14 @@
           </a:ln>
           <a:extLst>
             <a:ext uri="{909E8E84-426E-40dd-AFC4-6F175D3DCCD1}">
-              <a14:hiddenFill xmlns:a14="http://schemas.microsoft.com/office/drawing/2010/main" xmlns="">
+              <a14:hiddenFill xmlns="" xmlns:a14="http://schemas.microsoft.com/office/drawing/2010/main">
                 <a:solidFill>
                   <a:srgbClr val="FFFFFF"/>
                 </a:solidFill>
               </a14:hiddenFill>
             </a:ext>
             <a:ext uri="{91240B29-F687-4f45-9708-019B960494DF}">
-              <a14:hiddenLine xmlns:a14="http://schemas.microsoft.com/office/drawing/2010/main" xmlns="" w="9525">
+              <a14:hiddenLine xmlns="" xmlns:a14="http://schemas.microsoft.com/office/drawing/2010/main" w="9525">
                 <a:solidFill>
                   <a:srgbClr val="000000"/>
                 </a:solidFill>
@@ -4169,7 +4169,7 @@
           </a:ln>
           <a:extLst>
             <a:ext uri="{909E8E84-426E-40dd-AFC4-6F175D3DCCD1}">
-              <a14:hiddenFill xmlns:a14="http://schemas.microsoft.com/office/drawing/2010/main" xmlns="">
+              <a14:hiddenFill xmlns="" xmlns:a14="http://schemas.microsoft.com/office/drawing/2010/main">
                 <a:noFill/>
               </a14:hiddenFill>
             </a:ext>
@@ -4213,7 +4213,7 @@
           </a:ln>
           <a:extLst>
             <a:ext uri="{909E8E84-426E-40dd-AFC4-6F175D3DCCD1}">
-              <a14:hiddenFill xmlns:a14="http://schemas.microsoft.com/office/drawing/2010/main" xmlns="">
+              <a14:hiddenFill xmlns="" xmlns:a14="http://schemas.microsoft.com/office/drawing/2010/main">
                 <a:noFill/>
               </a14:hiddenFill>
             </a:ext>
@@ -4262,14 +4262,14 @@
           </a:ln>
           <a:extLst>
             <a:ext uri="{909E8E84-426E-40dd-AFC4-6F175D3DCCD1}">
-              <a14:hiddenFill xmlns:a14="http://schemas.microsoft.com/office/drawing/2010/main" xmlns="">
+              <a14:hiddenFill xmlns="" xmlns:a14="http://schemas.microsoft.com/office/drawing/2010/main">
                 <a:solidFill>
                   <a:srgbClr val="FFFFFF"/>
                 </a:solidFill>
               </a14:hiddenFill>
             </a:ext>
             <a:ext uri="{91240B29-F687-4f45-9708-019B960494DF}">
-              <a14:hiddenLine xmlns:a14="http://schemas.microsoft.com/office/drawing/2010/main" xmlns="" w="9525">
+              <a14:hiddenLine xmlns="" xmlns:a14="http://schemas.microsoft.com/office/drawing/2010/main" w="9525">
                 <a:solidFill>
                   <a:srgbClr val="000000"/>
                 </a:solidFill>
@@ -4543,7 +4543,7 @@
           </a:ln>
           <a:extLst>
             <a:ext uri="{909E8E84-426E-40dd-AFC4-6F175D3DCCD1}">
-              <a14:hiddenFill xmlns:a14="http://schemas.microsoft.com/office/drawing/2010/main" xmlns="">
+              <a14:hiddenFill xmlns="" xmlns:a14="http://schemas.microsoft.com/office/drawing/2010/main">
                 <a:noFill/>
               </a14:hiddenFill>
             </a:ext>
@@ -4757,7 +4757,7 @@
           </a:ln>
           <a:extLst>
             <a:ext uri="{909E8E84-426E-40dd-AFC4-6F175D3DCCD1}">
-              <a14:hiddenFill xmlns:a14="http://schemas.microsoft.com/office/drawing/2010/main" xmlns="">
+              <a14:hiddenFill xmlns="" xmlns:a14="http://schemas.microsoft.com/office/drawing/2010/main">
                 <a:noFill/>
               </a14:hiddenFill>
             </a:ext>
@@ -4976,7 +4976,7 @@
           </a:ln>
           <a:extLst>
             <a:ext uri="{909E8E84-426E-40dd-AFC4-6F175D3DCCD1}">
-              <a14:hiddenFill xmlns:a14="http://schemas.microsoft.com/office/drawing/2010/main" xmlns="">
+              <a14:hiddenFill xmlns="" xmlns:a14="http://schemas.microsoft.com/office/drawing/2010/main">
                 <a:noFill/>
               </a14:hiddenFill>
             </a:ext>
@@ -5227,7 +5227,7 @@
           </a:ln>
           <a:extLst>
             <a:ext uri="{909E8E84-426E-40dd-AFC4-6F175D3DCCD1}">
-              <a14:hiddenFill xmlns:a14="http://schemas.microsoft.com/office/drawing/2010/main" xmlns="">
+              <a14:hiddenFill xmlns="" xmlns:a14="http://schemas.microsoft.com/office/drawing/2010/main">
                 <a:noFill/>
               </a14:hiddenFill>
             </a:ext>
@@ -5276,14 +5276,14 @@
           </a:ln>
           <a:extLst>
             <a:ext uri="{909E8E84-426E-40dd-AFC4-6F175D3DCCD1}">
-              <a14:hiddenFill xmlns:a14="http://schemas.microsoft.com/office/drawing/2010/main" xmlns="">
+              <a14:hiddenFill xmlns="" xmlns:a14="http://schemas.microsoft.com/office/drawing/2010/main">
                 <a:solidFill>
                   <a:srgbClr val="FFFFFF"/>
                 </a:solidFill>
               </a14:hiddenFill>
             </a:ext>
             <a:ext uri="{91240B29-F687-4f45-9708-019B960494DF}">
-              <a14:hiddenLine xmlns:a14="http://schemas.microsoft.com/office/drawing/2010/main" xmlns="" w="9525">
+              <a14:hiddenLine xmlns="" xmlns:a14="http://schemas.microsoft.com/office/drawing/2010/main" w="9525">
                 <a:solidFill>
                   <a:srgbClr val="000000"/>
                 </a:solidFill>
@@ -5545,7 +5545,7 @@
           </a:ln>
           <a:extLst>
             <a:ext uri="{909E8E84-426E-40dd-AFC4-6F175D3DCCD1}">
-              <a14:hiddenFill xmlns:a14="http://schemas.microsoft.com/office/drawing/2010/main" xmlns="">
+              <a14:hiddenFill xmlns="" xmlns:a14="http://schemas.microsoft.com/office/drawing/2010/main">
                 <a:noFill/>
               </a14:hiddenFill>
             </a:ext>
@@ -5594,14 +5594,14 @@
           </a:ln>
           <a:extLst>
             <a:ext uri="{909E8E84-426E-40dd-AFC4-6F175D3DCCD1}">
-              <a14:hiddenFill xmlns:a14="http://schemas.microsoft.com/office/drawing/2010/main" xmlns="">
+              <a14:hiddenFill xmlns="" xmlns:a14="http://schemas.microsoft.com/office/drawing/2010/main">
                 <a:solidFill>
                   <a:srgbClr val="FFFFFF"/>
                 </a:solidFill>
               </a14:hiddenFill>
             </a:ext>
             <a:ext uri="{91240B29-F687-4f45-9708-019B960494DF}">
-              <a14:hiddenLine xmlns:a14="http://schemas.microsoft.com/office/drawing/2010/main" xmlns="" w="9525">
+              <a14:hiddenLine xmlns="" xmlns:a14="http://schemas.microsoft.com/office/drawing/2010/main" w="9525">
                 <a:solidFill>
                   <a:srgbClr val="000000"/>
                 </a:solidFill>
@@ -6071,7 +6071,7 @@
           </a:ln>
           <a:extLst>
             <a:ext uri="{909E8E84-426E-40dd-AFC4-6F175D3DCCD1}">
-              <a14:hiddenFill xmlns:a14="http://schemas.microsoft.com/office/drawing/2010/main" xmlns="">
+              <a14:hiddenFill xmlns="" xmlns:a14="http://schemas.microsoft.com/office/drawing/2010/main">
                 <a:noFill/>
               </a14:hiddenFill>
             </a:ext>
@@ -6101,7 +6101,7 @@
           <a:lstStyle/>
           <a:p>
             <a:r>
-              <a:rPr lang="zh-CHS" altLang="en-US" smtClean="0"/>
+              <a:rPr lang="zh-Hans" altLang="en-US" smtClean="0"/>
               <a:t>单击此处编辑母版标题样式</a:t>
             </a:r>
             <a:endParaRPr lang="en-US"/>
@@ -6143,35 +6143,35 @@
           <a:p>
             <a:pPr lvl="0"/>
             <a:r>
-              <a:rPr lang="zh-CHS" altLang="en-US" smtClean="0"/>
+              <a:rPr lang="zh-Hans" altLang="en-US" smtClean="0"/>
               <a:t>单击此处编辑母版文本样式</a:t>
             </a:r>
           </a:p>
           <a:p>
             <a:pPr lvl="1"/>
             <a:r>
-              <a:rPr lang="zh-CHS" altLang="en-US" smtClean="0"/>
+              <a:rPr lang="zh-Hans" altLang="en-US" smtClean="0"/>
               <a:t>第二级</a:t>
             </a:r>
           </a:p>
           <a:p>
             <a:pPr lvl="2"/>
             <a:r>
-              <a:rPr lang="zh-CHS" altLang="en-US" smtClean="0"/>
+              <a:rPr lang="zh-Hans" altLang="en-US" smtClean="0"/>
               <a:t>第三级</a:t>
             </a:r>
           </a:p>
           <a:p>
             <a:pPr lvl="3"/>
             <a:r>
-              <a:rPr lang="zh-CHS" altLang="en-US" smtClean="0"/>
+              <a:rPr lang="zh-Hans" altLang="en-US" smtClean="0"/>
               <a:t>第四级</a:t>
             </a:r>
           </a:p>
           <a:p>
             <a:pPr lvl="4"/>
             <a:r>
-              <a:rPr lang="zh-CHS" altLang="en-US" smtClean="0"/>
+              <a:rPr lang="zh-Hans" altLang="en-US" smtClean="0"/>
               <a:t>第五级</a:t>
             </a:r>
             <a:endParaRPr lang="en-US" dirty="0"/>
@@ -6450,7 +6450,7 @@
           </a:ln>
           <a:extLst>
             <a:ext uri="{909E8E84-426E-40dd-AFC4-6F175D3DCCD1}">
-              <a14:hiddenFill xmlns:a14="http://schemas.microsoft.com/office/drawing/2010/main" xmlns="">
+              <a14:hiddenFill xmlns="" xmlns:a14="http://schemas.microsoft.com/office/drawing/2010/main">
                 <a:noFill/>
               </a14:hiddenFill>
             </a:ext>
@@ -6491,7 +6491,7 @@
           </a:ln>
           <a:extLst>
             <a:ext uri="{909E8E84-426E-40dd-AFC4-6F175D3DCCD1}">
-              <a14:hiddenFill xmlns:a14="http://schemas.microsoft.com/office/drawing/2010/main" xmlns="">
+              <a14:hiddenFill xmlns="" xmlns:a14="http://schemas.microsoft.com/office/drawing/2010/main">
                 <a:noFill/>
               </a14:hiddenFill>
             </a:ext>
@@ -6702,7 +6702,7 @@
           </a:ln>
           <a:extLst>
             <a:ext uri="{909E8E84-426E-40dd-AFC4-6F175D3DCCD1}">
-              <a14:hiddenFill xmlns:a14="http://schemas.microsoft.com/office/drawing/2010/main" xmlns="">
+              <a14:hiddenFill xmlns="" xmlns:a14="http://schemas.microsoft.com/office/drawing/2010/main">
                 <a:noFill/>
               </a14:hiddenFill>
             </a:ext>
@@ -6751,14 +6751,14 @@
           </a:ln>
           <a:extLst>
             <a:ext uri="{909E8E84-426E-40dd-AFC4-6F175D3DCCD1}">
-              <a14:hiddenFill xmlns:a14="http://schemas.microsoft.com/office/drawing/2010/main" xmlns="">
+              <a14:hiddenFill xmlns="" xmlns:a14="http://schemas.microsoft.com/office/drawing/2010/main">
                 <a:solidFill>
                   <a:srgbClr val="FFFFFF"/>
                 </a:solidFill>
               </a14:hiddenFill>
             </a:ext>
             <a:ext uri="{91240B29-F687-4f45-9708-019B960494DF}">
-              <a14:hiddenLine xmlns:a14="http://schemas.microsoft.com/office/drawing/2010/main" xmlns="" w="9525">
+              <a14:hiddenLine xmlns="" xmlns:a14="http://schemas.microsoft.com/office/drawing/2010/main" w="9525">
                 <a:solidFill>
                   <a:srgbClr val="000000"/>
                 </a:solidFill>
@@ -6989,7 +6989,7 @@
           </a:ln>
           <a:extLst>
             <a:ext uri="{909E8E84-426E-40dd-AFC4-6F175D3DCCD1}">
-              <a14:hiddenFill xmlns:a14="http://schemas.microsoft.com/office/drawing/2010/main" xmlns="">
+              <a14:hiddenFill xmlns="" xmlns:a14="http://schemas.microsoft.com/office/drawing/2010/main">
                 <a:noFill/>
               </a14:hiddenFill>
             </a:ext>
@@ -7019,7 +7019,7 @@
           <a:lstStyle/>
           <a:p>
             <a:r>
-              <a:rPr lang="zh-CHS" altLang="en-US" smtClean="0"/>
+              <a:rPr lang="zh-Hans" altLang="en-US" smtClean="0"/>
               <a:t>单击此处编辑母版标题样式</a:t>
             </a:r>
             <a:endParaRPr lang="en-US"/>
@@ -7114,35 +7114,35 @@
           <a:p>
             <a:pPr lvl="0"/>
             <a:r>
-              <a:rPr lang="zh-CHS" altLang="en-US" smtClean="0"/>
+              <a:rPr lang="zh-Hans" altLang="en-US" smtClean="0"/>
               <a:t>单击此处编辑母版文本样式</a:t>
             </a:r>
           </a:p>
           <a:p>
             <a:pPr lvl="1"/>
             <a:r>
-              <a:rPr lang="zh-CHS" altLang="en-US" smtClean="0"/>
+              <a:rPr lang="zh-Hans" altLang="en-US" smtClean="0"/>
               <a:t>第二级</a:t>
             </a:r>
           </a:p>
           <a:p>
             <a:pPr lvl="2"/>
             <a:r>
-              <a:rPr lang="zh-CHS" altLang="en-US" smtClean="0"/>
+              <a:rPr lang="zh-Hans" altLang="en-US" smtClean="0"/>
               <a:t>第三级</a:t>
             </a:r>
           </a:p>
           <a:p>
             <a:pPr lvl="3"/>
             <a:r>
-              <a:rPr lang="zh-CHS" altLang="en-US" smtClean="0"/>
+              <a:rPr lang="zh-Hans" altLang="en-US" smtClean="0"/>
               <a:t>第四级</a:t>
             </a:r>
           </a:p>
           <a:p>
             <a:pPr lvl="4"/>
             <a:r>
-              <a:rPr lang="zh-CHS" altLang="en-US" smtClean="0"/>
+              <a:rPr lang="zh-Hans" altLang="en-US" smtClean="0"/>
               <a:t>第五级</a:t>
             </a:r>
             <a:endParaRPr lang="en-US" dirty="0"/>
@@ -7240,7 +7240,7 @@
           </a:ln>
           <a:extLst>
             <a:ext uri="{909E8E84-426E-40dd-AFC4-6F175D3DCCD1}">
-              <a14:hiddenFill xmlns:a14="http://schemas.microsoft.com/office/drawing/2010/main" xmlns="">
+              <a14:hiddenFill xmlns="" xmlns:a14="http://schemas.microsoft.com/office/drawing/2010/main">
                 <a:noFill/>
               </a14:hiddenFill>
             </a:ext>
@@ -7289,14 +7289,14 @@
           </a:ln>
           <a:extLst>
             <a:ext uri="{909E8E84-426E-40dd-AFC4-6F175D3DCCD1}">
-              <a14:hiddenFill xmlns:a14="http://schemas.microsoft.com/office/drawing/2010/main" xmlns="">
+              <a14:hiddenFill xmlns="" xmlns:a14="http://schemas.microsoft.com/office/drawing/2010/main">
                 <a:solidFill>
                   <a:srgbClr val="FFFFFF"/>
                 </a:solidFill>
               </a14:hiddenFill>
             </a:ext>
             <a:ext uri="{91240B29-F687-4f45-9708-019B960494DF}">
-              <a14:hiddenLine xmlns:a14="http://schemas.microsoft.com/office/drawing/2010/main" xmlns="" w="9525">
+              <a14:hiddenLine xmlns="" xmlns:a14="http://schemas.microsoft.com/office/drawing/2010/main" w="9525">
                 <a:solidFill>
                   <a:srgbClr val="000000"/>
                 </a:solidFill>
@@ -7347,7 +7347,7 @@
           </a:lstStyle>
           <a:p>
             <a:r>
-              <a:rPr lang="zh-CHS" altLang="en-US" noProof="0" smtClean="0">
+              <a:rPr lang="zh-Hans" altLang="en-US" noProof="0" smtClean="0">
                 <a:sym typeface="Open Sans Extrabold" charset="0"/>
               </a:rPr>
               <a:t>单击此处编辑母版标题样式</a:t>
@@ -7424,35 +7424,35 @@
           <a:p>
             <a:pPr lvl="0"/>
             <a:r>
-              <a:rPr lang="zh-CHS" altLang="en-US" smtClean="0"/>
+              <a:rPr lang="zh-Hans" altLang="en-US" smtClean="0"/>
               <a:t>单击此处编辑母版文本样式</a:t>
             </a:r>
           </a:p>
           <a:p>
             <a:pPr lvl="1"/>
             <a:r>
-              <a:rPr lang="zh-CHS" altLang="en-US" smtClean="0"/>
+              <a:rPr lang="zh-Hans" altLang="en-US" smtClean="0"/>
               <a:t>第二级</a:t>
             </a:r>
           </a:p>
           <a:p>
             <a:pPr lvl="2"/>
             <a:r>
-              <a:rPr lang="zh-CHS" altLang="en-US" smtClean="0"/>
+              <a:rPr lang="zh-Hans" altLang="en-US" smtClean="0"/>
               <a:t>第三级</a:t>
             </a:r>
           </a:p>
           <a:p>
             <a:pPr lvl="3"/>
             <a:r>
-              <a:rPr lang="zh-CHS" altLang="en-US" smtClean="0"/>
+              <a:rPr lang="zh-Hans" altLang="en-US" smtClean="0"/>
               <a:t>第四级</a:t>
             </a:r>
           </a:p>
           <a:p>
             <a:pPr lvl="4"/>
             <a:r>
-              <a:rPr lang="zh-CHS" altLang="en-US" smtClean="0"/>
+              <a:rPr lang="zh-Hans" altLang="en-US" smtClean="0"/>
               <a:t>第五级</a:t>
             </a:r>
             <a:endParaRPr lang="en-US" dirty="0"/>
@@ -7558,7 +7558,7 @@
           </a:ln>
           <a:extLst>
             <a:ext uri="{909E8E84-426E-40dd-AFC4-6F175D3DCCD1}">
-              <a14:hiddenFill xmlns:a14="http://schemas.microsoft.com/office/drawing/2010/main" xmlns="">
+              <a14:hiddenFill xmlns="" xmlns:a14="http://schemas.microsoft.com/office/drawing/2010/main">
                 <a:noFill/>
               </a14:hiddenFill>
             </a:ext>
@@ -7607,14 +7607,14 @@
           </a:ln>
           <a:extLst>
             <a:ext uri="{909E8E84-426E-40dd-AFC4-6F175D3DCCD1}">
-              <a14:hiddenFill xmlns:a14="http://schemas.microsoft.com/office/drawing/2010/main" xmlns="">
+              <a14:hiddenFill xmlns="" xmlns:a14="http://schemas.microsoft.com/office/drawing/2010/main">
                 <a:solidFill>
                   <a:srgbClr val="FFFFFF"/>
                 </a:solidFill>
               </a14:hiddenFill>
             </a:ext>
             <a:ext uri="{91240B29-F687-4f45-9708-019B960494DF}">
-              <a14:hiddenLine xmlns:a14="http://schemas.microsoft.com/office/drawing/2010/main" xmlns="" w="9525">
+              <a14:hiddenLine xmlns="" xmlns:a14="http://schemas.microsoft.com/office/drawing/2010/main" w="9525">
                 <a:solidFill>
                   <a:srgbClr val="000000"/>
                 </a:solidFill>
@@ -7669,7 +7669,7 @@
           </a:lstStyle>
           <a:p>
             <a:r>
-              <a:rPr lang="zh-CHS" altLang="en-US" noProof="0" smtClean="0">
+              <a:rPr lang="zh-Hans" altLang="en-US" noProof="0" smtClean="0">
                 <a:sym typeface="Open Sans Extrabold" charset="0"/>
               </a:rPr>
               <a:t>单击此处编辑母版标题样式</a:t>
@@ -7761,35 +7761,35 @@
           <a:p>
             <a:pPr lvl="0"/>
             <a:r>
-              <a:rPr lang="zh-CHS" altLang="en-US" smtClean="0"/>
+              <a:rPr lang="zh-Hans" altLang="en-US" smtClean="0"/>
               <a:t>单击此处编辑母版文本样式</a:t>
             </a:r>
           </a:p>
           <a:p>
             <a:pPr lvl="1"/>
             <a:r>
-              <a:rPr lang="zh-CHS" altLang="en-US" smtClean="0"/>
+              <a:rPr lang="zh-Hans" altLang="en-US" smtClean="0"/>
               <a:t>第二级</a:t>
             </a:r>
           </a:p>
           <a:p>
             <a:pPr lvl="2"/>
             <a:r>
-              <a:rPr lang="zh-CHS" altLang="en-US" smtClean="0"/>
+              <a:rPr lang="zh-Hans" altLang="en-US" smtClean="0"/>
               <a:t>第三级</a:t>
             </a:r>
           </a:p>
           <a:p>
             <a:pPr lvl="3"/>
             <a:r>
-              <a:rPr lang="zh-CHS" altLang="en-US" smtClean="0"/>
+              <a:rPr lang="zh-Hans" altLang="en-US" smtClean="0"/>
               <a:t>第四级</a:t>
             </a:r>
           </a:p>
           <a:p>
             <a:pPr lvl="4"/>
             <a:r>
-              <a:rPr lang="zh-CHS" altLang="en-US" smtClean="0"/>
+              <a:rPr lang="zh-Hans" altLang="en-US" smtClean="0"/>
               <a:t>第五级</a:t>
             </a:r>
             <a:endParaRPr lang="en-US" dirty="0"/>
@@ -7881,7 +7881,7 @@
           <a:lstStyle/>
           <a:p>
             <a:r>
-              <a:rPr lang="zh-CHS" altLang="en-US" smtClean="0"/>
+              <a:rPr lang="zh-Hans" altLang="en-US" smtClean="0"/>
               <a:t>单击此处编辑母版标题样式</a:t>
             </a:r>
             <a:endParaRPr lang="en-US" dirty="0"/>
@@ -7941,35 +7941,35 @@
           <a:p>
             <a:pPr lvl="0"/>
             <a:r>
-              <a:rPr lang="zh-CHS" altLang="en-US" smtClean="0"/>
+              <a:rPr lang="zh-Hans" altLang="en-US" smtClean="0"/>
               <a:t>单击此处编辑母版文本样式</a:t>
             </a:r>
           </a:p>
           <a:p>
             <a:pPr lvl="1"/>
             <a:r>
-              <a:rPr lang="zh-CHS" altLang="en-US" smtClean="0"/>
+              <a:rPr lang="zh-Hans" altLang="en-US" smtClean="0"/>
               <a:t>第二级</a:t>
             </a:r>
           </a:p>
           <a:p>
             <a:pPr lvl="2"/>
             <a:r>
-              <a:rPr lang="zh-CHS" altLang="en-US" smtClean="0"/>
+              <a:rPr lang="zh-Hans" altLang="en-US" smtClean="0"/>
               <a:t>第三级</a:t>
             </a:r>
           </a:p>
           <a:p>
             <a:pPr lvl="3"/>
             <a:r>
-              <a:rPr lang="zh-CHS" altLang="en-US" smtClean="0"/>
+              <a:rPr lang="zh-Hans" altLang="en-US" smtClean="0"/>
               <a:t>第四级</a:t>
             </a:r>
           </a:p>
           <a:p>
             <a:pPr lvl="4"/>
             <a:r>
-              <a:rPr lang="zh-CHS" altLang="en-US" smtClean="0"/>
+              <a:rPr lang="zh-Hans" altLang="en-US" smtClean="0"/>
               <a:t>第五级</a:t>
             </a:r>
             <a:endParaRPr lang="en-US" dirty="0"/>
@@ -8122,35 +8122,35 @@
           <a:p>
             <a:pPr lvl="0"/>
             <a:r>
-              <a:rPr lang="zh-CHS" altLang="en-US" smtClean="0"/>
+              <a:rPr lang="zh-Hans" altLang="en-US" smtClean="0"/>
               <a:t>单击此处编辑母版文本样式</a:t>
             </a:r>
           </a:p>
           <a:p>
             <a:pPr lvl="1"/>
             <a:r>
-              <a:rPr lang="zh-CHS" altLang="en-US" smtClean="0"/>
+              <a:rPr lang="zh-Hans" altLang="en-US" smtClean="0"/>
               <a:t>第二级</a:t>
             </a:r>
           </a:p>
           <a:p>
             <a:pPr lvl="2"/>
             <a:r>
-              <a:rPr lang="zh-CHS" altLang="en-US" smtClean="0"/>
+              <a:rPr lang="zh-Hans" altLang="en-US" smtClean="0"/>
               <a:t>第三级</a:t>
             </a:r>
           </a:p>
           <a:p>
             <a:pPr lvl="3"/>
             <a:r>
-              <a:rPr lang="zh-CHS" altLang="en-US" smtClean="0"/>
+              <a:rPr lang="zh-Hans" altLang="en-US" smtClean="0"/>
               <a:t>第四级</a:t>
             </a:r>
           </a:p>
           <a:p>
             <a:pPr lvl="4"/>
             <a:r>
-              <a:rPr lang="zh-CHS" altLang="en-US" smtClean="0"/>
+              <a:rPr lang="zh-Hans" altLang="en-US" smtClean="0"/>
               <a:t>第五级</a:t>
             </a:r>
             <a:endParaRPr lang="en-US" dirty="0"/>
@@ -8250,7 +8250,7 @@
           </a:ln>
           <a:extLst>
             <a:ext uri="{909E8E84-426E-40dd-AFC4-6F175D3DCCD1}">
-              <a14:hiddenFill xmlns:a14="http://schemas.microsoft.com/office/drawing/2010/main" xmlns="">
+              <a14:hiddenFill xmlns="" xmlns:a14="http://schemas.microsoft.com/office/drawing/2010/main">
                 <a:noFill/>
               </a14:hiddenFill>
             </a:ext>
@@ -8291,7 +8291,7 @@
           </a:ln>
           <a:extLst>
             <a:ext uri="{909E8E84-426E-40dd-AFC4-6F175D3DCCD1}">
-              <a14:hiddenFill xmlns:a14="http://schemas.microsoft.com/office/drawing/2010/main" xmlns="">
+              <a14:hiddenFill xmlns="" xmlns:a14="http://schemas.microsoft.com/office/drawing/2010/main">
                 <a:noFill/>
               </a14:hiddenFill>
             </a:ext>
@@ -8330,7 +8330,7 @@
           </a:lstStyle>
           <a:p>
             <a:r>
-              <a:rPr lang="zh-CHS" altLang="en-US" smtClean="0"/>
+              <a:rPr lang="zh-Hans" altLang="en-US" smtClean="0"/>
               <a:t>单击此处编辑母版标题样式</a:t>
             </a:r>
             <a:endParaRPr lang="en-US" dirty="0"/>
@@ -8434,17 +8434,17 @@
           <a:effectLst/>
           <a:extLst>
             <a:ext uri="{FAA26D3D-D897-4be2-8F04-BA451C77F1D7}">
-              <ma14:placeholderFlag xmlns:ma14="http://schemas.microsoft.com/office/mac/drawingml/2011/main" val="1"/>
+              <ma14:placeholderFlag xmlns:ma14="http://schemas.microsoft.com/office/mac/drawingml/2011/main" xmlns="" val="1"/>
             </a:ext>
             <a:ext uri="{909E8E84-426E-40dd-AFC4-6F175D3DCCD1}">
-              <a14:hiddenFill xmlns:a14="http://schemas.microsoft.com/office/drawing/2010/main" xmlns="">
+              <a14:hiddenFill xmlns="" xmlns:a14="http://schemas.microsoft.com/office/drawing/2010/main">
                 <a:solidFill>
                   <a:srgbClr val="FFFFFF"/>
                 </a:solidFill>
               </a14:hiddenFill>
             </a:ext>
             <a:ext uri="{91240B29-F687-4f45-9708-019B960494DF}">
-              <a14:hiddenLine xmlns:a14="http://schemas.microsoft.com/office/drawing/2010/main" xmlns="" w="12700">
+              <a14:hiddenLine xmlns="" xmlns:a14="http://schemas.microsoft.com/office/drawing/2010/main" w="12700">
                 <a:solidFill>
                   <a:schemeClr val="tx1"/>
                 </a:solidFill>
@@ -8454,7 +8454,7 @@
               </a14:hiddenLine>
             </a:ext>
             <a:ext uri="{AF507438-7753-43e0-B8FC-AC1667EBCBE1}">
-              <a14:hiddenEffects xmlns:a14="http://schemas.microsoft.com/office/drawing/2010/main" xmlns="">
+              <a14:hiddenEffects xmlns="" xmlns:a14="http://schemas.microsoft.com/office/drawing/2010/main">
                 <a:effectLst>
                   <a:outerShdw blurRad="63500" dist="38099" dir="2700000" algn="ctr" rotWithShape="0">
                     <a:srgbClr val="000000">
@@ -8476,7 +8476,7 @@
           <a:p>
             <a:pPr lvl="0"/>
             <a:r>
-              <a:rPr lang="zh-CHS" altLang="en-US" smtClean="0">
+              <a:rPr lang="zh-Hans" altLang="en-US" smtClean="0">
                 <a:sym typeface="Open Sans Extrabold" charset="0"/>
               </a:rPr>
               <a:t>单击此处编辑母版标题样式</a:t>
@@ -8512,17 +8512,17 @@
           <a:effectLst/>
           <a:extLst>
             <a:ext uri="{FAA26D3D-D897-4be2-8F04-BA451C77F1D7}">
-              <ma14:placeholderFlag xmlns:ma14="http://schemas.microsoft.com/office/mac/drawingml/2011/main" val="1"/>
+              <ma14:placeholderFlag xmlns:ma14="http://schemas.microsoft.com/office/mac/drawingml/2011/main" xmlns="" val="1"/>
             </a:ext>
             <a:ext uri="{909E8E84-426E-40dd-AFC4-6F175D3DCCD1}">
-              <a14:hiddenFill xmlns:a14="http://schemas.microsoft.com/office/drawing/2010/main" xmlns="">
+              <a14:hiddenFill xmlns="" xmlns:a14="http://schemas.microsoft.com/office/drawing/2010/main">
                 <a:solidFill>
                   <a:srgbClr val="FFFFFF"/>
                 </a:solidFill>
               </a14:hiddenFill>
             </a:ext>
             <a:ext uri="{91240B29-F687-4f45-9708-019B960494DF}">
-              <a14:hiddenLine xmlns:a14="http://schemas.microsoft.com/office/drawing/2010/main" xmlns="" w="12700">
+              <a14:hiddenLine xmlns="" xmlns:a14="http://schemas.microsoft.com/office/drawing/2010/main" w="12700">
                 <a:solidFill>
                   <a:schemeClr val="tx1"/>
                 </a:solidFill>
@@ -8532,7 +8532,7 @@
               </a14:hiddenLine>
             </a:ext>
             <a:ext uri="{AF507438-7753-43e0-B8FC-AC1667EBCBE1}">
-              <a14:hiddenEffects xmlns:a14="http://schemas.microsoft.com/office/drawing/2010/main" xmlns="">
+              <a14:hiddenEffects xmlns="" xmlns:a14="http://schemas.microsoft.com/office/drawing/2010/main">
                 <a:effectLst>
                   <a:outerShdw blurRad="63500" dist="38099" dir="2700000" algn="ctr" rotWithShape="0">
                     <a:srgbClr val="000000">
@@ -8554,7 +8554,7 @@
           <a:p>
             <a:pPr lvl="0"/>
             <a:r>
-              <a:rPr lang="zh-CHS" altLang="en-US" smtClean="0">
+              <a:rPr lang="zh-Hans" altLang="en-US" smtClean="0">
                 <a:sym typeface="Open Sans Light" charset="0"/>
               </a:rPr>
               <a:t>单击此处编辑母版文本样式</a:t>
@@ -8563,7 +8563,7 @@
           <a:p>
             <a:pPr lvl="1"/>
             <a:r>
-              <a:rPr lang="zh-CHS" altLang="en-US" smtClean="0">
+              <a:rPr lang="zh-Hans" altLang="en-US" smtClean="0">
                 <a:sym typeface="Open Sans Light" charset="0"/>
               </a:rPr>
               <a:t>第二级</a:t>
@@ -8572,7 +8572,7 @@
           <a:p>
             <a:pPr lvl="2"/>
             <a:r>
-              <a:rPr lang="zh-CHS" altLang="en-US" smtClean="0">
+              <a:rPr lang="zh-Hans" altLang="en-US" smtClean="0">
                 <a:sym typeface="Open Sans Light" charset="0"/>
               </a:rPr>
               <a:t>第三级</a:t>
@@ -8581,7 +8581,7 @@
           <a:p>
             <a:pPr lvl="3"/>
             <a:r>
-              <a:rPr lang="zh-CHS" altLang="en-US" smtClean="0">
+              <a:rPr lang="zh-Hans" altLang="en-US" smtClean="0">
                 <a:sym typeface="Open Sans Light" charset="0"/>
               </a:rPr>
               <a:t>第四级</a:t>
@@ -8590,7 +8590,7 @@
           <a:p>
             <a:pPr lvl="4"/>
             <a:r>
-              <a:rPr lang="zh-CHS" altLang="en-US" smtClean="0">
+              <a:rPr lang="zh-Hans" altLang="en-US" smtClean="0">
                 <a:sym typeface="Open Sans Light" charset="0"/>
               </a:rPr>
               <a:t>第五级</a:t>
@@ -8626,14 +8626,14 @@
           <a:effectLst/>
           <a:extLst>
             <a:ext uri="{909E8E84-426E-40dd-AFC4-6F175D3DCCD1}">
-              <a14:hiddenFill xmlns:a14="http://schemas.microsoft.com/office/drawing/2010/main" xmlns="">
+              <a14:hiddenFill xmlns="" xmlns:a14="http://schemas.microsoft.com/office/drawing/2010/main">
                 <a:solidFill>
                   <a:srgbClr val="FFFFFF"/>
                 </a:solidFill>
               </a14:hiddenFill>
             </a:ext>
             <a:ext uri="{91240B29-F687-4f45-9708-019B960494DF}">
-              <a14:hiddenLine xmlns:a14="http://schemas.microsoft.com/office/drawing/2010/main" xmlns="" w="12700">
+              <a14:hiddenLine xmlns="" xmlns:a14="http://schemas.microsoft.com/office/drawing/2010/main" w="12700">
                 <a:solidFill>
                   <a:schemeClr val="tx1"/>
                 </a:solidFill>
@@ -8643,7 +8643,7 @@
               </a14:hiddenLine>
             </a:ext>
             <a:ext uri="{AF507438-7753-43e0-B8FC-AC1667EBCBE1}">
-              <a14:hiddenEffects xmlns:a14="http://schemas.microsoft.com/office/drawing/2010/main" xmlns="">
+              <a14:hiddenEffects xmlns="" xmlns:a14="http://schemas.microsoft.com/office/drawing/2010/main">
                 <a:effectLst>
                   <a:outerShdw blurRad="63500" dist="38099" dir="2700000" algn="ctr" rotWithShape="0">
                     <a:srgbClr val="000000">
@@ -9329,17 +9329,17 @@
           <a:effectLst/>
           <a:extLst>
             <a:ext uri="{FAA26D3D-D897-4be2-8F04-BA451C77F1D7}">
-              <ma14:placeholderFlag xmlns:ma14="http://schemas.microsoft.com/office/mac/drawingml/2011/main" val="1"/>
+              <ma14:placeholderFlag xmlns:ma14="http://schemas.microsoft.com/office/mac/drawingml/2011/main" xmlns="" val="1"/>
             </a:ext>
             <a:ext uri="{909E8E84-426E-40dd-AFC4-6F175D3DCCD1}">
-              <a14:hiddenFill xmlns:a14="http://schemas.microsoft.com/office/drawing/2010/main" xmlns="">
+              <a14:hiddenFill xmlns="" xmlns:a14="http://schemas.microsoft.com/office/drawing/2010/main">
                 <a:solidFill>
                   <a:srgbClr val="FFFFFF"/>
                 </a:solidFill>
               </a14:hiddenFill>
             </a:ext>
             <a:ext uri="{91240B29-F687-4f45-9708-019B960494DF}">
-              <a14:hiddenLine xmlns:a14="http://schemas.microsoft.com/office/drawing/2010/main" xmlns="" w="12700">
+              <a14:hiddenLine xmlns="" xmlns:a14="http://schemas.microsoft.com/office/drawing/2010/main" w="12700">
                 <a:solidFill>
                   <a:schemeClr val="tx1"/>
                 </a:solidFill>
@@ -9349,7 +9349,7 @@
               </a14:hiddenLine>
             </a:ext>
             <a:ext uri="{AF507438-7753-43e0-B8FC-AC1667EBCBE1}">
-              <a14:hiddenEffects xmlns:a14="http://schemas.microsoft.com/office/drawing/2010/main" xmlns="">
+              <a14:hiddenEffects xmlns="" xmlns:a14="http://schemas.microsoft.com/office/drawing/2010/main">
                 <a:effectLst>
                   <a:outerShdw blurRad="63500" dist="38099" dir="2700000" algn="ctr" rotWithShape="0">
                     <a:srgbClr val="000000">
@@ -9404,17 +9404,17 @@
           <a:effectLst/>
           <a:extLst>
             <a:ext uri="{FAA26D3D-D897-4be2-8F04-BA451C77F1D7}">
-              <ma14:placeholderFlag xmlns:ma14="http://schemas.microsoft.com/office/mac/drawingml/2011/main" val="1"/>
+              <ma14:placeholderFlag xmlns:ma14="http://schemas.microsoft.com/office/mac/drawingml/2011/main" xmlns="" val="1"/>
             </a:ext>
             <a:ext uri="{909E8E84-426E-40dd-AFC4-6F175D3DCCD1}">
-              <a14:hiddenFill xmlns:a14="http://schemas.microsoft.com/office/drawing/2010/main" xmlns="">
+              <a14:hiddenFill xmlns="" xmlns:a14="http://schemas.microsoft.com/office/drawing/2010/main">
                 <a:solidFill>
                   <a:srgbClr val="FFFFFF"/>
                 </a:solidFill>
               </a14:hiddenFill>
             </a:ext>
             <a:ext uri="{91240B29-F687-4f45-9708-019B960494DF}">
-              <a14:hiddenLine xmlns:a14="http://schemas.microsoft.com/office/drawing/2010/main" xmlns="" w="12700">
+              <a14:hiddenLine xmlns="" xmlns:a14="http://schemas.microsoft.com/office/drawing/2010/main" w="12700">
                 <a:solidFill>
                   <a:schemeClr val="tx1"/>
                 </a:solidFill>
@@ -9424,7 +9424,7 @@
               </a14:hiddenLine>
             </a:ext>
             <a:ext uri="{AF507438-7753-43e0-B8FC-AC1667EBCBE1}">
-              <a14:hiddenEffects xmlns:a14="http://schemas.microsoft.com/office/drawing/2010/main" xmlns="">
+              <a14:hiddenEffects xmlns="" xmlns:a14="http://schemas.microsoft.com/office/drawing/2010/main">
                 <a:effectLst>
                   <a:outerShdw blurRad="63500" dist="38099" dir="2700000" algn="ctr" rotWithShape="0">
                     <a:srgbClr val="000000">
@@ -9515,14 +9515,14 @@
           <a:effectLst/>
           <a:extLst>
             <a:ext uri="{909E8E84-426E-40dd-AFC4-6F175D3DCCD1}">
-              <a14:hiddenFill xmlns:a14="http://schemas.microsoft.com/office/drawing/2010/main" xmlns="">
+              <a14:hiddenFill xmlns="" xmlns:a14="http://schemas.microsoft.com/office/drawing/2010/main">
                 <a:solidFill>
                   <a:srgbClr val="FFFFFF"/>
                 </a:solidFill>
               </a14:hiddenFill>
             </a:ext>
             <a:ext uri="{91240B29-F687-4f45-9708-019B960494DF}">
-              <a14:hiddenLine xmlns:a14="http://schemas.microsoft.com/office/drawing/2010/main" xmlns="" w="12700">
+              <a14:hiddenLine xmlns="" xmlns:a14="http://schemas.microsoft.com/office/drawing/2010/main" w="12700">
                 <a:solidFill>
                   <a:schemeClr val="tx1"/>
                 </a:solidFill>
@@ -9532,7 +9532,7 @@
               </a14:hiddenLine>
             </a:ext>
             <a:ext uri="{AF507438-7753-43e0-B8FC-AC1667EBCBE1}">
-              <a14:hiddenEffects xmlns:a14="http://schemas.microsoft.com/office/drawing/2010/main" xmlns="">
+              <a14:hiddenEffects xmlns="" xmlns:a14="http://schemas.microsoft.com/office/drawing/2010/main">
                 <a:effectLst>
                   <a:outerShdw blurRad="63500" dist="38099" dir="2700000" algn="ctr" rotWithShape="0">
                     <a:srgbClr val="000000">
@@ -10227,17 +10227,17 @@
           <a:effectLst/>
           <a:extLst>
             <a:ext uri="{FAA26D3D-D897-4be2-8F04-BA451C77F1D7}">
-              <ma14:placeholderFlag xmlns:ma14="http://schemas.microsoft.com/office/mac/drawingml/2011/main" val="1"/>
+              <ma14:placeholderFlag xmlns:ma14="http://schemas.microsoft.com/office/mac/drawingml/2011/main" xmlns="" val="1"/>
             </a:ext>
             <a:ext uri="{909E8E84-426E-40dd-AFC4-6F175D3DCCD1}">
-              <a14:hiddenFill xmlns:a14="http://schemas.microsoft.com/office/drawing/2010/main" xmlns="">
+              <a14:hiddenFill xmlns="" xmlns:a14="http://schemas.microsoft.com/office/drawing/2010/main">
                 <a:solidFill>
                   <a:srgbClr val="FFFFFF"/>
                 </a:solidFill>
               </a14:hiddenFill>
             </a:ext>
             <a:ext uri="{91240B29-F687-4f45-9708-019B960494DF}">
-              <a14:hiddenLine xmlns:a14="http://schemas.microsoft.com/office/drawing/2010/main" xmlns="" w="12700">
+              <a14:hiddenLine xmlns="" xmlns:a14="http://schemas.microsoft.com/office/drawing/2010/main" w="12700">
                 <a:solidFill>
                   <a:schemeClr val="tx1"/>
                 </a:solidFill>
@@ -10247,7 +10247,7 @@
               </a14:hiddenLine>
             </a:ext>
             <a:ext uri="{AF507438-7753-43e0-B8FC-AC1667EBCBE1}">
-              <a14:hiddenEffects xmlns:a14="http://schemas.microsoft.com/office/drawing/2010/main" xmlns="">
+              <a14:hiddenEffects xmlns="" xmlns:a14="http://schemas.microsoft.com/office/drawing/2010/main">
                 <a:effectLst>
                   <a:outerShdw blurRad="63500" dist="38099" dir="2700000" algn="ctr" rotWithShape="0">
                     <a:srgbClr val="000000">
@@ -10302,17 +10302,17 @@
           <a:effectLst/>
           <a:extLst>
             <a:ext uri="{FAA26D3D-D897-4be2-8F04-BA451C77F1D7}">
-              <ma14:placeholderFlag xmlns:ma14="http://schemas.microsoft.com/office/mac/drawingml/2011/main" val="1"/>
+              <ma14:placeholderFlag xmlns:ma14="http://schemas.microsoft.com/office/mac/drawingml/2011/main" xmlns="" val="1"/>
             </a:ext>
             <a:ext uri="{909E8E84-426E-40dd-AFC4-6F175D3DCCD1}">
-              <a14:hiddenFill xmlns:a14="http://schemas.microsoft.com/office/drawing/2010/main" xmlns="">
+              <a14:hiddenFill xmlns="" xmlns:a14="http://schemas.microsoft.com/office/drawing/2010/main">
                 <a:solidFill>
                   <a:srgbClr val="FFFFFF"/>
                 </a:solidFill>
               </a14:hiddenFill>
             </a:ext>
             <a:ext uri="{91240B29-F687-4f45-9708-019B960494DF}">
-              <a14:hiddenLine xmlns:a14="http://schemas.microsoft.com/office/drawing/2010/main" xmlns="" w="12700">
+              <a14:hiddenLine xmlns="" xmlns:a14="http://schemas.microsoft.com/office/drawing/2010/main" w="12700">
                 <a:solidFill>
                   <a:schemeClr val="tx1"/>
                 </a:solidFill>
@@ -10322,7 +10322,7 @@
               </a14:hiddenLine>
             </a:ext>
             <a:ext uri="{AF507438-7753-43e0-B8FC-AC1667EBCBE1}">
-              <a14:hiddenEffects xmlns:a14="http://schemas.microsoft.com/office/drawing/2010/main" xmlns="">
+              <a14:hiddenEffects xmlns="" xmlns:a14="http://schemas.microsoft.com/office/drawing/2010/main">
                 <a:effectLst>
                   <a:outerShdw blurRad="63500" dist="38099" dir="2700000" algn="ctr" rotWithShape="0">
                     <a:srgbClr val="000000">
@@ -10413,14 +10413,14 @@
           <a:effectLst/>
           <a:extLst>
             <a:ext uri="{909E8E84-426E-40dd-AFC4-6F175D3DCCD1}">
-              <a14:hiddenFill xmlns:a14="http://schemas.microsoft.com/office/drawing/2010/main" xmlns="">
+              <a14:hiddenFill xmlns="" xmlns:a14="http://schemas.microsoft.com/office/drawing/2010/main">
                 <a:solidFill>
                   <a:srgbClr val="FFFFFF"/>
                 </a:solidFill>
               </a14:hiddenFill>
             </a:ext>
             <a:ext uri="{91240B29-F687-4f45-9708-019B960494DF}">
-              <a14:hiddenLine xmlns:a14="http://schemas.microsoft.com/office/drawing/2010/main" xmlns="" w="12700">
+              <a14:hiddenLine xmlns="" xmlns:a14="http://schemas.microsoft.com/office/drawing/2010/main" w="12700">
                 <a:solidFill>
                   <a:schemeClr val="tx1"/>
                 </a:solidFill>
@@ -10430,7 +10430,7 @@
               </a14:hiddenLine>
             </a:ext>
             <a:ext uri="{AF507438-7753-43e0-B8FC-AC1667EBCBE1}">
-              <a14:hiddenEffects xmlns:a14="http://schemas.microsoft.com/office/drawing/2010/main" xmlns="">
+              <a14:hiddenEffects xmlns="" xmlns:a14="http://schemas.microsoft.com/office/drawing/2010/main">
                 <a:effectLst>
                   <a:outerShdw blurRad="63500" dist="38099" dir="2700000" algn="ctr" rotWithShape="0">
                     <a:srgbClr val="000000">
@@ -11111,14 +11111,14 @@
               <a:defRPr/>
             </a:pPr>
             <a:r>
-              <a:rPr lang="en-US" dirty="0" err="1" smtClean="0"/>
-              <a:t>Gtest</a:t>
-            </a:r>
-            <a:r>
-              <a:rPr lang="en-US" dirty="0" smtClean="0"/>
-              <a:t> Introduction</a:t>
-            </a:r>
-            <a:endParaRPr lang="en-US" dirty="0" smtClean="0"/>
+              <a:rPr lang="en-US" cap="none" dirty="0" smtClean="0"/>
+              <a:t>Introduction To </a:t>
+            </a:r>
+            <a:r>
+              <a:rPr lang="en-US" cap="none" dirty="0" err="1" smtClean="0"/>
+              <a:t>GTest</a:t>
+            </a:r>
+            <a:endParaRPr lang="en-US" cap="none" dirty="0" smtClean="0"/>
           </a:p>
         </p:txBody>
       </p:sp>
@@ -11224,10 +11224,10 @@
           <a:p>
             <a:pPr algn="ctr"/>
             <a:r>
-              <a:rPr lang="en-US" altLang="zh-CHS" dirty="0" smtClean="0"/>
+              <a:rPr lang="en-US" altLang="zh-Hans" dirty="0" smtClean="0"/>
               <a:t>TEST Fixture</a:t>
             </a:r>
-            <a:endParaRPr lang="zh-CHS" altLang="en-US" dirty="0"/>
+            <a:endParaRPr lang="zh-Hans" altLang="en-US" dirty="0"/>
           </a:p>
         </p:txBody>
       </p:sp>
@@ -11248,11 +11248,11 @@
           <a:p>
             <a:pPr marL="0" lvl="0"/>
             <a:r>
-              <a:rPr lang="en-US" altLang="zh-CHS" sz="4400" dirty="0" smtClean="0"/>
+              <a:rPr lang="en-US" altLang="zh-Hans" sz="4400" dirty="0" smtClean="0"/>
               <a:t>A test fixture allows you to </a:t>
             </a:r>
             <a:r>
-              <a:rPr lang="en-US" altLang="zh-CHS" sz="4400" dirty="0" smtClean="0">
+              <a:rPr lang="en-US" altLang="zh-Hans" sz="4400" dirty="0" smtClean="0">
                 <a:solidFill>
                   <a:srgbClr val="FF0000"/>
                 </a:solidFill>
@@ -11260,13 +11260,13 @@
               <a:t>reuse</a:t>
             </a:r>
             <a:r>
-              <a:rPr lang="en-US" altLang="zh-CHS" sz="4400" dirty="0" smtClean="0"/>
+              <a:rPr lang="en-US" altLang="zh-Hans" sz="4400" dirty="0" smtClean="0"/>
               <a:t> the same configuration of objects for several different tests</a:t>
             </a:r>
           </a:p>
           <a:p>
             <a:pPr marL="0"/>
-            <a:endParaRPr lang="zh-CHS" altLang="en-US" dirty="0"/>
+            <a:endParaRPr lang="zh-Hans" altLang="en-US" dirty="0"/>
           </a:p>
         </p:txBody>
       </p:sp>
@@ -11381,10 +11381,10 @@
           <a:p>
             <a:pPr algn="ctr"/>
             <a:r>
-              <a:rPr lang="en-US" altLang="zh-CHS" dirty="0" smtClean="0"/>
+              <a:rPr lang="en-US" altLang="zh-Hans" dirty="0" smtClean="0"/>
               <a:t>TEST FIXTURE Internals</a:t>
             </a:r>
-            <a:endParaRPr lang="zh-CHS" altLang="en-US" dirty="0"/>
+            <a:endParaRPr lang="zh-Hans" altLang="en-US" dirty="0"/>
           </a:p>
         </p:txBody>
       </p:sp>
@@ -11416,21 +11416,21 @@
               <a:buChar char="p"/>
             </a:pPr>
             <a:r>
-              <a:rPr lang="en-US" altLang="zh-CHS" sz="2800" dirty="0" smtClean="0">
+              <a:rPr lang="en-US" altLang="zh-Hans" sz="2800" dirty="0" smtClean="0">
                 <a:latin typeface="Open Sans Light"/>
                 <a:cs typeface="Calibri" pitchFamily="34" charset="0"/>
               </a:rPr>
               <a:t>Google Test constructs a </a:t>
             </a:r>
             <a:r>
-              <a:rPr lang="en-US" altLang="zh-CHS" sz="2800" dirty="0" err="1" smtClean="0">
+              <a:rPr lang="en-US" altLang="zh-Hans" sz="2800" dirty="0" err="1" smtClean="0">
                 <a:latin typeface="Open Sans Light"/>
                 <a:cs typeface="Calibri" pitchFamily="34" charset="0"/>
               </a:rPr>
               <a:t>BookSpec</a:t>
             </a:r>
             <a:r>
-              <a:rPr lang="en-US" altLang="zh-CHS" sz="2800" dirty="0" smtClean="0">
+              <a:rPr lang="en-US" altLang="zh-Hans" sz="2800" dirty="0" smtClean="0">
                 <a:latin typeface="Open Sans Light"/>
                 <a:cs typeface="Calibri" pitchFamily="34" charset="0"/>
               </a:rPr>
@@ -11446,7 +11446,7 @@
               <a:buChar char="p"/>
             </a:pPr>
             <a:r>
-              <a:rPr lang="en-US" altLang="zh-CHS" sz="2800" dirty="0" smtClean="0">
+              <a:rPr lang="en-US" altLang="zh-Hans" sz="2800" dirty="0" smtClean="0">
                 <a:latin typeface="Open Sans Light"/>
                 <a:cs typeface="Calibri" pitchFamily="34" charset="0"/>
               </a:rPr>
@@ -11462,28 +11462,28 @@
               <a:buChar char="p"/>
             </a:pPr>
             <a:r>
-              <a:rPr lang="en-US" altLang="zh-CHS" sz="2800" dirty="0" smtClean="0">
+              <a:rPr lang="en-US" altLang="zh-Hans" sz="2800" dirty="0" smtClean="0">
                 <a:latin typeface="Open Sans Light"/>
                 <a:cs typeface="Calibri" pitchFamily="34" charset="0"/>
               </a:rPr>
               <a:t>the test(</a:t>
             </a:r>
             <a:r>
-              <a:rPr lang="en-US" altLang="zh-CHS" sz="2400" dirty="0" err="1" smtClean="0">
+              <a:rPr lang="en-US" altLang="zh-Hans" sz="2400" dirty="0" err="1" smtClean="0">
                 <a:latin typeface="Open Sans Light"/>
                 <a:cs typeface="Calibri" pitchFamily="34" charset="0"/>
               </a:rPr>
               <a:t>ShouldAbleToBeCompared</a:t>
             </a:r>
             <a:r>
-              <a:rPr lang="en-US" altLang="zh-CHS" sz="2400" dirty="0" smtClean="0">
+              <a:rPr lang="en-US" altLang="zh-Hans" sz="2400" dirty="0" smtClean="0">
                 <a:latin typeface="Open Sans Light"/>
                 <a:cs typeface="Calibri" pitchFamily="34" charset="0"/>
               </a:rPr>
               <a:t>) </a:t>
             </a:r>
             <a:r>
-              <a:rPr lang="en-US" altLang="zh-CHS" sz="2800" dirty="0" smtClean="0">
+              <a:rPr lang="en-US" altLang="zh-Hans" sz="2800" dirty="0" smtClean="0">
                 <a:latin typeface="Open Sans Light"/>
                 <a:cs typeface="Calibri" pitchFamily="34" charset="0"/>
               </a:rPr>
@@ -11499,7 +11499,7 @@
               <a:buChar char="p"/>
             </a:pPr>
             <a:r>
-              <a:rPr lang="en-US" altLang="zh-CHS" sz="2800" dirty="0" smtClean="0">
+              <a:rPr lang="en-US" altLang="zh-Hans" sz="2800" dirty="0" smtClean="0">
                 <a:latin typeface="Open Sans Light"/>
                 <a:cs typeface="Calibri" pitchFamily="34" charset="0"/>
               </a:rPr>
@@ -11515,7 +11515,7 @@
               <a:buChar char="p"/>
             </a:pPr>
             <a:r>
-              <a:rPr lang="en-US" altLang="zh-CHS" sz="2800" dirty="0" smtClean="0">
+              <a:rPr lang="en-US" altLang="zh-Hans" sz="2800" dirty="0" smtClean="0">
                 <a:latin typeface="Open Sans Light"/>
                 <a:cs typeface="Calibri" pitchFamily="34" charset="0"/>
               </a:rPr>
@@ -11530,7 +11530,7 @@
               <a:buFont typeface="Wingdings" pitchFamily="2" charset="2"/>
               <a:buChar char="p"/>
             </a:pPr>
-            <a:endParaRPr lang="zh-CHS" altLang="en-US" sz="2800" dirty="0">
+            <a:endParaRPr lang="zh-Hans" altLang="en-US" sz="2800" dirty="0">
               <a:latin typeface="Calibri" pitchFamily="34" charset="0"/>
               <a:cs typeface="Calibri" pitchFamily="34" charset="0"/>
             </a:endParaRPr>
@@ -11653,10 +11653,10 @@
           <a:p>
             <a:pPr algn="ctr"/>
             <a:r>
-              <a:rPr lang="en-US" altLang="zh-CHS" sz="4800" dirty="0" smtClean="0"/>
+              <a:rPr lang="en-US" altLang="zh-Hans" sz="4800" dirty="0" smtClean="0"/>
               <a:t>EXERCISE</a:t>
             </a:r>
-            <a:endParaRPr lang="zh-CHS" altLang="en-US" sz="4800" dirty="0"/>
+            <a:endParaRPr lang="zh-Hans" altLang="en-US" sz="4800" dirty="0"/>
           </a:p>
         </p:txBody>
       </p:sp>
@@ -11688,7 +11688,7 @@
               <a:buFont typeface="Wingdings" charset="2"/>
               <a:buChar char=""/>
             </a:pPr>
-            <a:endParaRPr lang="en-US" altLang="zh-CHS" sz="3600" dirty="0" smtClean="0"/>
+            <a:endParaRPr lang="en-US" altLang="zh-Hans" sz="3600" dirty="0" smtClean="0"/>
           </a:p>
           <a:p>
             <a:pPr marL="520700" indent="-520700">
@@ -11705,15 +11705,15 @@
               <a:buChar char=""/>
             </a:pPr>
             <a:r>
-              <a:rPr lang="en-US" altLang="zh-CHS" sz="3600" dirty="0" smtClean="0"/>
+              <a:rPr lang="en-US" altLang="zh-Hans" sz="3600" dirty="0" smtClean="0"/>
               <a:t>Open </a:t>
             </a:r>
             <a:r>
-              <a:rPr lang="en-US" altLang="zh-CHS" sz="3600" dirty="0" err="1" smtClean="0"/>
+              <a:rPr lang="en-US" altLang="zh-Hans" sz="3600" dirty="0" err="1" smtClean="0"/>
               <a:t>gtest_sample</a:t>
             </a:r>
             <a:r>
-              <a:rPr lang="en-US" altLang="zh-CHS" sz="3600" dirty="0" smtClean="0"/>
+              <a:rPr lang="en-US" altLang="zh-Hans" sz="3600" dirty="0" smtClean="0"/>
               <a:t>, Compile and run</a:t>
             </a:r>
           </a:p>
@@ -11731,7 +11731,7 @@
               <a:buFont typeface="Wingdings" charset="2"/>
               <a:buChar char=""/>
             </a:pPr>
-            <a:endParaRPr lang="en-US" altLang="zh-CHS" sz="3600" dirty="0" smtClean="0"/>
+            <a:endParaRPr lang="en-US" altLang="zh-Hans" sz="3600" dirty="0" smtClean="0"/>
           </a:p>
           <a:p>
             <a:pPr marL="520700" indent="-520700">
@@ -11748,11 +11748,11 @@
               <a:buChar char=""/>
             </a:pPr>
             <a:r>
-              <a:rPr lang="en-US" altLang="zh-CHS" sz="3600" dirty="0" err="1" smtClean="0"/>
+              <a:rPr lang="en-US" altLang="zh-Hans" sz="3600" dirty="0" err="1" smtClean="0"/>
               <a:t>SalesMan</a:t>
             </a:r>
             <a:r>
-              <a:rPr lang="en-US" altLang="zh-CHS" sz="3600" dirty="0" smtClean="0"/>
+              <a:rPr lang="en-US" altLang="zh-Hans" sz="3600" dirty="0" smtClean="0"/>
               <a:t> should answer “see you” to “bye”</a:t>
             </a:r>
           </a:p>
@@ -11770,7 +11770,7 @@
               <a:buFont typeface="Wingdings" charset="2"/>
               <a:buChar char=""/>
             </a:pPr>
-            <a:endParaRPr lang="en-US" altLang="zh-CHS" sz="3600" dirty="0" smtClean="0"/>
+            <a:endParaRPr lang="en-US" altLang="zh-Hans" sz="3600" dirty="0" smtClean="0"/>
           </a:p>
           <a:p>
             <a:pPr marL="520700" indent="-520700">
@@ -11787,14 +11787,14 @@
               <a:buChar char=""/>
             </a:pPr>
             <a:r>
-              <a:rPr lang="en-US" altLang="zh-CHS" sz="3600" dirty="0" err="1" smtClean="0"/>
+              <a:rPr lang="en-US" altLang="zh-Hans" sz="3600" dirty="0" err="1" smtClean="0"/>
               <a:t>SalesMan</a:t>
             </a:r>
             <a:r>
-              <a:rPr lang="en-US" altLang="zh-CHS" sz="3600" dirty="0" smtClean="0"/>
+              <a:rPr lang="en-US" altLang="zh-Hans" sz="3600" dirty="0" smtClean="0"/>
               <a:t> should throw an exception if question is empty</a:t>
             </a:r>
-            <a:endParaRPr lang="zh-CHS" altLang="en-US" sz="3600" dirty="0"/>
+            <a:endParaRPr lang="zh-Hans" altLang="en-US" sz="3600" dirty="0"/>
           </a:p>
         </p:txBody>
       </p:sp>
@@ -12162,10 +12162,10 @@
           <a:p>
             <a:pPr algn="ctr"/>
             <a:r>
-              <a:rPr lang="en-US" altLang="zh-CHS" dirty="0" smtClean="0"/>
+              <a:rPr lang="en-US" altLang="zh-Hans" dirty="0" smtClean="0"/>
               <a:t>Why Google Test</a:t>
             </a:r>
-            <a:endParaRPr lang="zh-CHS" altLang="en-US" dirty="0"/>
+            <a:endParaRPr lang="zh-Hans" altLang="en-US" dirty="0"/>
           </a:p>
         </p:txBody>
       </p:sp>
@@ -12185,42 +12185,42 @@
           <a:lstStyle/>
           <a:p>
             <a:r>
-              <a:rPr lang="en-US" altLang="zh-CHS" sz="3400" dirty="0" smtClean="0"/>
+              <a:rPr lang="en-US" altLang="zh-Hans" sz="3400" dirty="0" smtClean="0"/>
               <a:t>Google Test is designed to be portable</a:t>
             </a:r>
           </a:p>
           <a:p>
             <a:r>
-              <a:rPr lang="en-US" altLang="zh-CHS" sz="3400" dirty="0" smtClean="0"/>
+              <a:rPr lang="en-US" altLang="zh-Hans" sz="3400" dirty="0" smtClean="0"/>
               <a:t>Google Test automatically detects your tests and doesn't require you to enumerate them in order to run them</a:t>
             </a:r>
           </a:p>
           <a:p>
             <a:r>
-              <a:rPr lang="en-US" altLang="zh-CHS" sz="3400" dirty="0" smtClean="0"/>
+              <a:rPr lang="en-US" altLang="zh-Hans" sz="3400" dirty="0" smtClean="0"/>
               <a:t>Simple things are easy in Google Test, while hard things are possible</a:t>
             </a:r>
           </a:p>
           <a:p>
             <a:r>
-              <a:rPr lang="en-US" altLang="zh-CHS" sz="3400" dirty="0" smtClean="0"/>
+              <a:rPr lang="en-US" altLang="zh-Hans" sz="3400" dirty="0" smtClean="0"/>
               <a:t>Easy to write assertions that generate informative messages</a:t>
             </a:r>
           </a:p>
           <a:p>
             <a:r>
-              <a:rPr lang="en-US" altLang="zh-CHS" sz="3400" dirty="0" smtClean="0"/>
+              <a:rPr lang="en-US" altLang="zh-Hans" sz="3400" dirty="0" smtClean="0"/>
               <a:t>You can decide which tests to run using name patterns</a:t>
             </a:r>
           </a:p>
           <a:p>
             <a:r>
-              <a:rPr lang="en-US" altLang="zh-CHS" sz="3400" dirty="0" smtClean="0"/>
+              <a:rPr lang="en-US" altLang="zh-Hans" sz="3400" dirty="0" smtClean="0"/>
               <a:t>Google Test can generate XML test result reports </a:t>
             </a:r>
           </a:p>
           <a:p>
-            <a:endParaRPr lang="zh-CHS" altLang="en-US" sz="3400" dirty="0"/>
+            <a:endParaRPr lang="zh-Hans" altLang="en-US" sz="3400" dirty="0"/>
           </a:p>
         </p:txBody>
       </p:sp>
@@ -12303,10 +12303,10 @@
           <a:p>
             <a:pPr algn="ctr"/>
             <a:r>
-              <a:rPr lang="en-US" altLang="zh-CHS" dirty="0" smtClean="0"/>
+              <a:rPr lang="en-US" altLang="zh-Hans" dirty="0" smtClean="0"/>
               <a:t>BASIC CONCEPTS</a:t>
             </a:r>
-            <a:endParaRPr lang="zh-CHS" altLang="en-US" dirty="0"/>
+            <a:endParaRPr lang="zh-Hans" altLang="en-US" dirty="0"/>
           </a:p>
         </p:txBody>
       </p:sp>
@@ -12356,13 +12356,13 @@
           <a:p>
             <a:pPr marL="0" lvl="0"/>
             <a:r>
-              <a:rPr lang="en-US" altLang="zh-CHS" sz="4400" dirty="0" smtClean="0">
+              <a:rPr lang="en-US" altLang="zh-Hans" sz="4400" dirty="0" smtClean="0">
                 <a:sym typeface="Calibri"/>
               </a:rPr>
               <a:t>Start by writing </a:t>
             </a:r>
             <a:r>
-              <a:rPr lang="en-US" altLang="zh-CHS" sz="4400" dirty="0" smtClean="0">
+              <a:rPr lang="en-US" altLang="zh-Hans" sz="4400" dirty="0" smtClean="0">
                 <a:solidFill>
                   <a:srgbClr val="FF0000"/>
                 </a:solidFill>
@@ -12371,14 +12371,14 @@
               <a:t>assertions</a:t>
             </a:r>
             <a:r>
-              <a:rPr lang="en-US" altLang="zh-CHS" sz="4400" dirty="0" smtClean="0">
+              <a:rPr lang="en-US" altLang="zh-Hans" sz="4400" dirty="0" smtClean="0">
                 <a:sym typeface="Calibri"/>
               </a:rPr>
               <a:t>. An assertion's result can be success, nonfatal failure, or fatal failure</a:t>
             </a:r>
           </a:p>
           <a:p>
-            <a:endParaRPr lang="zh-CHS" altLang="en-US" sz="4400" dirty="0"/>
+            <a:endParaRPr lang="zh-Hans" altLang="en-US" sz="4400" dirty="0"/>
           </a:p>
         </p:txBody>
       </p:sp>
@@ -12464,10 +12464,10 @@
           <a:p>
             <a:pPr algn="ctr"/>
             <a:r>
-              <a:rPr lang="en-US" altLang="zh-CHS" dirty="0" smtClean="0"/>
+              <a:rPr lang="en-US" altLang="zh-Hans" dirty="0" smtClean="0"/>
               <a:t>ASSERTIONS</a:t>
             </a:r>
-            <a:endParaRPr lang="zh-CHS" altLang="en-US" dirty="0"/>
+            <a:endParaRPr lang="zh-Hans" altLang="en-US" dirty="0"/>
           </a:p>
         </p:txBody>
       </p:sp>
@@ -12487,17 +12487,17 @@
           <a:lstStyle/>
           <a:p>
             <a:r>
-              <a:rPr lang="en-US" altLang="zh-CHS" sz="3400" dirty="0" smtClean="0"/>
+              <a:rPr lang="en-US" altLang="zh-Hans" sz="3400" dirty="0" smtClean="0"/>
               <a:t>EXPECT_* generate nonfatal failures, which don't abort the current function</a:t>
             </a:r>
           </a:p>
           <a:p>
             <a:r>
-              <a:rPr lang="en-US" altLang="zh-CHS" sz="3400" dirty="0" smtClean="0"/>
+              <a:rPr lang="en-US" altLang="zh-Hans" sz="3400" dirty="0" smtClean="0"/>
               <a:t>ASSERT_* generate fatal failures when they fail, and </a:t>
             </a:r>
             <a:r>
-              <a:rPr lang="en-US" altLang="zh-CHS" sz="3400" dirty="0" smtClean="0">
+              <a:rPr lang="en-US" altLang="zh-Hans" sz="3400" dirty="0" smtClean="0">
                 <a:solidFill>
                   <a:srgbClr val="FF0000"/>
                 </a:solidFill>
@@ -12506,7 +12506,7 @@
             </a:r>
           </a:p>
           <a:p>
-            <a:endParaRPr lang="zh-CHS" altLang="en-US" sz="3400" dirty="0"/>
+            <a:endParaRPr lang="zh-Hans" altLang="en-US" sz="3400" dirty="0"/>
           </a:p>
         </p:txBody>
       </p:sp>
@@ -12615,10 +12615,10 @@
           <a:p>
             <a:pPr algn="ctr"/>
             <a:r>
-              <a:rPr lang="en-US" altLang="zh-CHS" dirty="0" smtClean="0"/>
+              <a:rPr lang="en-US" altLang="zh-Hans" dirty="0" smtClean="0"/>
               <a:t>Requirement</a:t>
             </a:r>
-            <a:endParaRPr lang="zh-CHS" altLang="en-US" dirty="0"/>
+            <a:endParaRPr lang="zh-Hans" altLang="en-US" dirty="0"/>
           </a:p>
         </p:txBody>
       </p:sp>
@@ -12638,23 +12638,23 @@
           <a:lstStyle/>
           <a:p>
             <a:r>
-              <a:rPr lang="en-US" altLang="zh-CHS" sz="3400" dirty="0" smtClean="0"/>
+              <a:rPr lang="en-US" altLang="zh-Hans" sz="3400" dirty="0" smtClean="0"/>
               <a:t>Value arguments must be comparable by the assertion's comparison operator</a:t>
             </a:r>
           </a:p>
           <a:p>
             <a:r>
-              <a:rPr lang="en-US" altLang="zh-CHS" sz="3400" dirty="0" smtClean="0"/>
+              <a:rPr lang="en-US" altLang="zh-Hans" sz="3400" dirty="0" smtClean="0"/>
               <a:t>Values must support the &lt;&lt; operator for streaming to an std::</a:t>
             </a:r>
             <a:r>
-              <a:rPr lang="en-US" altLang="zh-CHS" sz="3400" dirty="0" err="1" smtClean="0"/>
+              <a:rPr lang="en-US" altLang="zh-Hans" sz="3400" dirty="0" err="1" smtClean="0"/>
               <a:t>ostream</a:t>
             </a:r>
-            <a:endParaRPr lang="en-US" altLang="zh-CHS" sz="3400" dirty="0" smtClean="0"/>
-          </a:p>
-          <a:p>
-            <a:endParaRPr lang="zh-CHS" altLang="en-US" sz="3400" dirty="0"/>
+            <a:endParaRPr lang="en-US" altLang="zh-Hans" sz="3400" dirty="0" smtClean="0"/>
+          </a:p>
+          <a:p>
+            <a:endParaRPr lang="zh-Hans" altLang="en-US" sz="3400" dirty="0"/>
           </a:p>
         </p:txBody>
       </p:sp>
@@ -12769,10 +12769,10 @@
           <a:p>
             <a:pPr algn="ctr"/>
             <a:r>
-              <a:rPr lang="en-US" altLang="zh-CHS" dirty="0" smtClean="0"/>
+              <a:rPr lang="en-US" altLang="zh-Hans" dirty="0" smtClean="0"/>
               <a:t>TEST STRUCTURE</a:t>
             </a:r>
-            <a:endParaRPr lang="zh-CHS" altLang="en-US" dirty="0"/>
+            <a:endParaRPr lang="zh-Hans" altLang="en-US" dirty="0"/>
           </a:p>
         </p:txBody>
       </p:sp>
@@ -12905,7 +12905,7 @@
             <a:effectLst/>
             <a:extLst>
               <a:ext uri="{C572A759-6A51-4108-AA02-DFA0A04FC94B}">
-                <ma14:wrappingTextBoxFlag xmlns:ma14="http://schemas.microsoft.com/office/mac/drawingml/2011/main" val="1"/>
+                <ma14:wrappingTextBoxFlag xmlns:ma14="http://schemas.microsoft.com/office/mac/drawingml/2011/main" xmlns="" val="1"/>
               </a:ext>
             </a:extLst>
           </p:spPr>
@@ -13196,7 +13196,7 @@
             <a:effectLst/>
             <a:extLst>
               <a:ext uri="{C572A759-6A51-4108-AA02-DFA0A04FC94B}">
-                <ma14:wrappingTextBoxFlag xmlns:ma14="http://schemas.microsoft.com/office/mac/drawingml/2011/main" val="1"/>
+                <ma14:wrappingTextBoxFlag xmlns:ma14="http://schemas.microsoft.com/office/mac/drawingml/2011/main" xmlns="" val="1"/>
               </a:ext>
             </a:extLst>
           </p:spPr>
@@ -13445,7 +13445,7 @@
             <a:effectLst/>
             <a:extLst>
               <a:ext uri="{C572A759-6A51-4108-AA02-DFA0A04FC94B}">
-                <ma14:wrappingTextBoxFlag xmlns:ma14="http://schemas.microsoft.com/office/mac/drawingml/2011/main" val="1"/>
+                <ma14:wrappingTextBoxFlag xmlns:ma14="http://schemas.microsoft.com/office/mac/drawingml/2011/main" xmlns="" val="1"/>
               </a:ext>
             </a:extLst>
           </p:spPr>
@@ -13694,7 +13694,7 @@
             <a:effectLst/>
             <a:extLst>
               <a:ext uri="{C572A759-6A51-4108-AA02-DFA0A04FC94B}">
-                <ma14:wrappingTextBoxFlag xmlns:ma14="http://schemas.microsoft.com/office/mac/drawingml/2011/main" val="1"/>
+                <ma14:wrappingTextBoxFlag xmlns:ma14="http://schemas.microsoft.com/office/mac/drawingml/2011/main" xmlns="" val="1"/>
               </a:ext>
             </a:extLst>
           </p:spPr>
@@ -13812,7 +13812,7 @@
             <a:effectLst/>
             <a:extLst>
               <a:ext uri="{C572A759-6A51-4108-AA02-DFA0A04FC94B}">
-                <ma14:wrappingTextBoxFlag xmlns:ma14="http://schemas.microsoft.com/office/mac/drawingml/2011/main" val="1"/>
+                <ma14:wrappingTextBoxFlag xmlns:ma14="http://schemas.microsoft.com/office/mac/drawingml/2011/main" xmlns="" val="1"/>
               </a:ext>
             </a:extLst>
           </p:spPr>
@@ -13930,7 +13930,7 @@
             <a:effectLst/>
             <a:extLst>
               <a:ext uri="{C572A759-6A51-4108-AA02-DFA0A04FC94B}">
-                <ma14:wrappingTextBoxFlag xmlns:ma14="http://schemas.microsoft.com/office/mac/drawingml/2011/main" val="1"/>
+                <ma14:wrappingTextBoxFlag xmlns:ma14="http://schemas.microsoft.com/office/mac/drawingml/2011/main" xmlns="" val="1"/>
               </a:ext>
             </a:extLst>
           </p:spPr>
@@ -14048,7 +14048,7 @@
             <a:effectLst/>
             <a:extLst>
               <a:ext uri="{C572A759-6A51-4108-AA02-DFA0A04FC94B}">
-                <ma14:wrappingTextBoxFlag xmlns:ma14="http://schemas.microsoft.com/office/mac/drawingml/2011/main" val="1"/>
+                <ma14:wrappingTextBoxFlag xmlns:ma14="http://schemas.microsoft.com/office/mac/drawingml/2011/main" xmlns="" val="1"/>
               </a:ext>
             </a:extLst>
           </p:spPr>
@@ -14166,7 +14166,7 @@
             <a:effectLst/>
             <a:extLst>
               <a:ext uri="{C572A759-6A51-4108-AA02-DFA0A04FC94B}">
-                <ma14:wrappingTextBoxFlag xmlns:ma14="http://schemas.microsoft.com/office/mac/drawingml/2011/main" val="1"/>
+                <ma14:wrappingTextBoxFlag xmlns:ma14="http://schemas.microsoft.com/office/mac/drawingml/2011/main" xmlns="" val="1"/>
               </a:ext>
             </a:extLst>
           </p:spPr>
@@ -14284,7 +14284,7 @@
             <a:effectLst/>
             <a:extLst>
               <a:ext uri="{C572A759-6A51-4108-AA02-DFA0A04FC94B}">
-                <ma14:wrappingTextBoxFlag xmlns:ma14="http://schemas.microsoft.com/office/mac/drawingml/2011/main" val="1"/>
+                <ma14:wrappingTextBoxFlag xmlns:ma14="http://schemas.microsoft.com/office/mac/drawingml/2011/main" xmlns="" val="1"/>
               </a:ext>
             </a:extLst>
           </p:spPr>
@@ -14402,7 +14402,7 @@
             <a:effectLst/>
             <a:extLst>
               <a:ext uri="{C572A759-6A51-4108-AA02-DFA0A04FC94B}">
-                <ma14:wrappingTextBoxFlag xmlns:ma14="http://schemas.microsoft.com/office/mac/drawingml/2011/main" val="1"/>
+                <ma14:wrappingTextBoxFlag xmlns:ma14="http://schemas.microsoft.com/office/mac/drawingml/2011/main" xmlns="" val="1"/>
               </a:ext>
             </a:extLst>
           </p:spPr>
@@ -14517,10 +14517,10 @@
           <a:p>
             <a:pPr algn="ctr"/>
             <a:r>
-              <a:rPr lang="en-US" altLang="zh-CHS" spc="-210" dirty="0" smtClean="0"/>
+              <a:rPr lang="en-US" altLang="zh-Hans" spc="-210" dirty="0" smtClean="0"/>
               <a:t>USING GTEST</a:t>
             </a:r>
-            <a:endParaRPr lang="zh-CHS" altLang="en-US" dirty="0"/>
+            <a:endParaRPr lang="zh-Hans" altLang="en-US" dirty="0"/>
           </a:p>
         </p:txBody>
       </p:sp>
@@ -14540,68 +14540,68 @@
           <a:lstStyle/>
           <a:p>
             <a:r>
-              <a:rPr lang="en-US" altLang="zh-CHS" sz="3400" dirty="0" smtClean="0"/>
+              <a:rPr lang="en-US" altLang="zh-Hans" sz="3400" dirty="0" smtClean="0"/>
               <a:t>include &lt;</a:t>
             </a:r>
             <a:r>
-              <a:rPr lang="en-US" altLang="zh-CHS" sz="3400" dirty="0" err="1" smtClean="0"/>
+              <a:rPr lang="en-US" altLang="zh-Hans" sz="3400" dirty="0" err="1" smtClean="0"/>
               <a:t>gtest</a:t>
             </a:r>
             <a:r>
-              <a:rPr lang="en-US" altLang="zh-CHS" sz="3400" dirty="0" smtClean="0"/>
+              <a:rPr lang="en-US" altLang="zh-Hans" sz="3400" dirty="0" smtClean="0"/>
               <a:t>/</a:t>
             </a:r>
             <a:r>
-              <a:rPr lang="en-US" altLang="zh-CHS" sz="3400" dirty="0" err="1" smtClean="0"/>
+              <a:rPr lang="en-US" altLang="zh-Hans" sz="3400" dirty="0" err="1" smtClean="0"/>
               <a:t>gtest.h</a:t>
             </a:r>
             <a:r>
-              <a:rPr lang="en-US" altLang="zh-CHS" sz="3400" dirty="0" smtClean="0"/>
+              <a:rPr lang="en-US" altLang="zh-Hans" sz="3400" dirty="0" smtClean="0"/>
               <a:t>&gt;</a:t>
             </a:r>
           </a:p>
           <a:p>
             <a:r>
-              <a:rPr lang="en-US" altLang="zh-CHS" sz="3400" dirty="0" smtClean="0"/>
+              <a:rPr lang="en-US" altLang="zh-Hans" sz="3400" dirty="0" smtClean="0"/>
               <a:t>write your tests in any source files</a:t>
             </a:r>
           </a:p>
           <a:p>
             <a:r>
-              <a:rPr lang="en-US" altLang="zh-CHS" sz="3400" dirty="0" smtClean="0"/>
+              <a:rPr lang="en-US" altLang="zh-Hans" sz="3400" dirty="0" smtClean="0"/>
               <a:t>initialize </a:t>
             </a:r>
             <a:r>
-              <a:rPr lang="en-US" altLang="zh-CHS" sz="3400" dirty="0" err="1" smtClean="0"/>
+              <a:rPr lang="en-US" altLang="zh-Hans" sz="3400" dirty="0" err="1" smtClean="0"/>
               <a:t>gtest</a:t>
             </a:r>
             <a:r>
-              <a:rPr lang="en-US" altLang="zh-CHS" sz="3400" dirty="0" smtClean="0"/>
+              <a:rPr lang="en-US" altLang="zh-Hans" sz="3400" dirty="0" smtClean="0"/>
               <a:t> by </a:t>
             </a:r>
             <a:r>
-              <a:rPr lang="en-US" altLang="zh-CHS" sz="3400" dirty="0" err="1" smtClean="0"/>
+              <a:rPr lang="en-US" altLang="zh-Hans" sz="3400" dirty="0" err="1" smtClean="0"/>
               <a:t>InitGoogleTest</a:t>
             </a:r>
             <a:r>
-              <a:rPr lang="en-US" altLang="zh-CHS" sz="3400" dirty="0" smtClean="0"/>
+              <a:rPr lang="en-US" altLang="zh-Hans" sz="3400" dirty="0" smtClean="0"/>
               <a:t>()</a:t>
             </a:r>
           </a:p>
           <a:p>
             <a:r>
-              <a:rPr lang="en-US" altLang="zh-CHS" sz="3400" dirty="0" smtClean="0"/>
+              <a:rPr lang="en-US" altLang="zh-Hans" sz="3400" dirty="0" smtClean="0"/>
               <a:t>call RUN_ALL_TESTS() in main() function</a:t>
             </a:r>
           </a:p>
           <a:p>
             <a:r>
-              <a:rPr lang="en-US" altLang="zh-CHS" sz="3400" dirty="0" smtClean="0"/>
+              <a:rPr lang="en-US" altLang="zh-Hans" sz="3400" dirty="0" smtClean="0"/>
               <a:t>compile and run</a:t>
             </a:r>
           </a:p>
           <a:p>
-            <a:endParaRPr lang="zh-CHS" altLang="en-US" sz="3400" dirty="0"/>
+            <a:endParaRPr lang="zh-Hans" altLang="en-US" sz="3400" dirty="0"/>
           </a:p>
         </p:txBody>
       </p:sp>
@@ -14721,10 +14721,10 @@
           <a:p>
             <a:pPr algn="ctr"/>
             <a:r>
-              <a:rPr lang="en-US" altLang="zh-CHS" sz="4800" dirty="0" smtClean="0"/>
+              <a:rPr lang="en-US" altLang="zh-Hans" sz="4800" dirty="0" smtClean="0"/>
               <a:t>EXERCISE</a:t>
             </a:r>
-            <a:endParaRPr lang="zh-CHS" altLang="en-US" sz="4800" dirty="0"/>
+            <a:endParaRPr lang="zh-Hans" altLang="en-US" sz="4800" dirty="0"/>
           </a:p>
         </p:txBody>
       </p:sp>
@@ -14756,7 +14756,7 @@
               <a:buFont typeface="Wingdings" charset="2"/>
               <a:buChar char=""/>
             </a:pPr>
-            <a:endParaRPr lang="en-US" altLang="zh-CHS" sz="3600" dirty="0" smtClean="0"/>
+            <a:endParaRPr lang="en-US" altLang="zh-Hans" sz="3600" dirty="0" smtClean="0"/>
           </a:p>
           <a:p>
             <a:pPr marL="520700" indent="-520700">
@@ -14773,15 +14773,15 @@
               <a:buChar char=""/>
             </a:pPr>
             <a:r>
-              <a:rPr lang="en-US" altLang="zh-CHS" sz="3600" dirty="0" smtClean="0"/>
+              <a:rPr lang="en-US" altLang="zh-Hans" sz="3600" dirty="0" smtClean="0"/>
               <a:t>Open </a:t>
             </a:r>
             <a:r>
-              <a:rPr lang="en-US" altLang="zh-CHS" sz="3600" dirty="0" err="1" smtClean="0"/>
+              <a:rPr lang="en-US" altLang="zh-Hans" sz="3600" dirty="0" err="1" smtClean="0"/>
               <a:t>gtest_sample</a:t>
             </a:r>
             <a:r>
-              <a:rPr lang="en-US" altLang="zh-CHS" sz="3600" dirty="0" smtClean="0"/>
+              <a:rPr lang="en-US" altLang="zh-Hans" sz="3600" dirty="0" smtClean="0"/>
               <a:t>, Compile and run</a:t>
             </a:r>
           </a:p>
@@ -14799,7 +14799,7 @@
               <a:buFont typeface="Wingdings" charset="2"/>
               <a:buChar char=""/>
             </a:pPr>
-            <a:endParaRPr lang="en-US" altLang="zh-CHS" sz="3600" dirty="0" smtClean="0"/>
+            <a:endParaRPr lang="en-US" altLang="zh-Hans" sz="3600" dirty="0" smtClean="0"/>
           </a:p>
           <a:p>
             <a:pPr marL="520700" indent="-520700">
@@ -14816,11 +14816,11 @@
               <a:buChar char=""/>
             </a:pPr>
             <a:r>
-              <a:rPr lang="en-US" altLang="zh-CHS" sz="3600" dirty="0" err="1" smtClean="0"/>
+              <a:rPr lang="en-US" altLang="zh-Hans" sz="3600" dirty="0" err="1" smtClean="0"/>
               <a:t>SalesMan</a:t>
             </a:r>
             <a:r>
-              <a:rPr lang="en-US" altLang="zh-CHS" sz="3600" dirty="0" smtClean="0"/>
+              <a:rPr lang="en-US" altLang="zh-Hans" sz="3600" dirty="0" smtClean="0"/>
               <a:t> should answer “see you” to “bye”</a:t>
             </a:r>
           </a:p>
@@ -14838,7 +14838,7 @@
               <a:buFont typeface="Wingdings" charset="2"/>
               <a:buChar char=""/>
             </a:pPr>
-            <a:endParaRPr lang="en-US" altLang="zh-CHS" sz="3600" dirty="0" smtClean="0"/>
+            <a:endParaRPr lang="en-US" altLang="zh-Hans" sz="3600" dirty="0" smtClean="0"/>
           </a:p>
           <a:p>
             <a:pPr marL="520700" indent="-520700">
@@ -14855,14 +14855,14 @@
               <a:buChar char=""/>
             </a:pPr>
             <a:r>
-              <a:rPr lang="en-US" altLang="zh-CHS" sz="3600" dirty="0" err="1" smtClean="0"/>
+              <a:rPr lang="en-US" altLang="zh-Hans" sz="3600" dirty="0" err="1" smtClean="0"/>
               <a:t>SalesMan</a:t>
             </a:r>
             <a:r>
-              <a:rPr lang="en-US" altLang="zh-CHS" sz="3600" dirty="0" smtClean="0"/>
+              <a:rPr lang="en-US" altLang="zh-Hans" sz="3600" dirty="0" smtClean="0"/>
               <a:t> should throw an exception if question is empty</a:t>
             </a:r>
-            <a:endParaRPr lang="zh-CHS" altLang="en-US" sz="3600" dirty="0"/>
+            <a:endParaRPr lang="zh-Hans" altLang="en-US" sz="3600" dirty="0"/>
           </a:p>
         </p:txBody>
       </p:sp>
@@ -15207,7 +15207,7 @@
         <a:effectLst/>
         <a:extLst>
           <a:ext uri="{91240B29-F687-4f45-9708-019B960494DF}">
-            <a14:hiddenLine xmlns:a14="http://schemas.microsoft.com/office/drawing/2010/main" xmlns="" w="25400" cap="flat" cmpd="sng" algn="ctr">
+            <a14:hiddenLine xmlns="" xmlns:a14="http://schemas.microsoft.com/office/drawing/2010/main" w="25400" cap="flat" cmpd="sng" algn="ctr">
               <a:solidFill>
                 <a:srgbClr val="000000"/>
               </a:solidFill>
@@ -15218,7 +15218,7 @@
             </a14:hiddenLine>
           </a:ext>
           <a:ext uri="{AF507438-7753-43e0-B8FC-AC1667EBCBE1}">
-            <a14:hiddenEffects xmlns:a14="http://schemas.microsoft.com/office/drawing/2010/main" xmlns="">
+            <a14:hiddenEffects xmlns="" xmlns:a14="http://schemas.microsoft.com/office/drawing/2010/main">
               <a:effectLst>
                 <a:outerShdw blurRad="63500" dist="38099" dir="2700000" algn="ctr" rotWithShape="0">
                   <a:schemeClr val="bg2">
@@ -15594,7 +15594,7 @@
         <a:effectLst/>
         <a:extLst>
           <a:ext uri="{91240B29-F687-4f45-9708-019B960494DF}">
-            <a14:hiddenLine xmlns:a14="http://schemas.microsoft.com/office/drawing/2010/main" xmlns="" w="25400" cap="flat" cmpd="sng" algn="ctr">
+            <a14:hiddenLine xmlns="" xmlns:a14="http://schemas.microsoft.com/office/drawing/2010/main" w="25400" cap="flat" cmpd="sng" algn="ctr">
               <a:solidFill>
                 <a:srgbClr val="000000"/>
               </a:solidFill>
@@ -15605,7 +15605,7 @@
             </a14:hiddenLine>
           </a:ext>
           <a:ext uri="{AF507438-7753-43e0-B8FC-AC1667EBCBE1}">
-            <a14:hiddenEffects xmlns:a14="http://schemas.microsoft.com/office/drawing/2010/main" xmlns="">
+            <a14:hiddenEffects xmlns="" xmlns:a14="http://schemas.microsoft.com/office/drawing/2010/main">
               <a:effectLst>
                 <a:outerShdw blurRad="63500" dist="38099" dir="2700000" algn="ctr" rotWithShape="0">
                   <a:schemeClr val="bg2">
@@ -15981,7 +15981,7 @@
         <a:effectLst/>
         <a:extLst>
           <a:ext uri="{91240B29-F687-4f45-9708-019B960494DF}">
-            <a14:hiddenLine xmlns:a14="http://schemas.microsoft.com/office/drawing/2010/main" xmlns="" w="25400" cap="flat" cmpd="sng" algn="ctr">
+            <a14:hiddenLine xmlns="" xmlns:a14="http://schemas.microsoft.com/office/drawing/2010/main" w="25400" cap="flat" cmpd="sng" algn="ctr">
               <a:solidFill>
                 <a:srgbClr val="000000"/>
               </a:solidFill>
@@ -15992,7 +15992,7 @@
             </a14:hiddenLine>
           </a:ext>
           <a:ext uri="{AF507438-7753-43e0-B8FC-AC1667EBCBE1}">
-            <a14:hiddenEffects xmlns:a14="http://schemas.microsoft.com/office/drawing/2010/main" xmlns="">
+            <a14:hiddenEffects xmlns="" xmlns:a14="http://schemas.microsoft.com/office/drawing/2010/main">
               <a:effectLst>
                 <a:outerShdw blurRad="63500" dist="38099" dir="2700000" algn="ctr" rotWithShape="0">
                   <a:schemeClr val="bg2">

</xml_diff>